<commit_message>
Added Item viewer canvas, added new graphics and icons for better visuals
</commit_message>
<xml_diff>
--- a/Assets/Textures/Icons.pptx
+++ b/Assets/Textures/Icons.pptx
@@ -7,16 +7,19 @@
   <p:sldIdLst>
     <p:sldId id="256" r:id="rId2"/>
     <p:sldId id="257" r:id="rId3"/>
-    <p:sldId id="258" r:id="rId4"/>
+    <p:sldId id="260" r:id="rId4"/>
+    <p:sldId id="261" r:id="rId5"/>
+    <p:sldId id="258" r:id="rId6"/>
+    <p:sldId id="259" r:id="rId7"/>
   </p:sldIdLst>
-  <p:sldSz cx="9144000" cy="6858000" type="screen4x3"/>
+  <p:sldSz cx="18288000" cy="11704638"/>
   <p:notesSz cx="6858000" cy="9144000"/>
   <p:defaultTextStyle>
     <a:defPPr>
       <a:defRPr lang="en-US"/>
     </a:defPPr>
-    <a:lvl1pPr marL="0" algn="l" defTabSz="914400" rtl="0" eaLnBrk="1" latinLnBrk="0" hangingPunct="1">
-      <a:defRPr sz="1800" kern="1200">
+    <a:lvl1pPr marL="0" algn="l" defTabSz="1619768" rtl="0" eaLnBrk="1" latinLnBrk="0" hangingPunct="1">
+      <a:defRPr sz="3200" kern="1200">
         <a:solidFill>
           <a:schemeClr val="tx1"/>
         </a:solidFill>
@@ -25,8 +28,8 @@
         <a:cs typeface="+mn-cs"/>
       </a:defRPr>
     </a:lvl1pPr>
-    <a:lvl2pPr marL="457200" algn="l" defTabSz="914400" rtl="0" eaLnBrk="1" latinLnBrk="0" hangingPunct="1">
-      <a:defRPr sz="1800" kern="1200">
+    <a:lvl2pPr marL="809884" algn="l" defTabSz="1619768" rtl="0" eaLnBrk="1" latinLnBrk="0" hangingPunct="1">
+      <a:defRPr sz="3200" kern="1200">
         <a:solidFill>
           <a:schemeClr val="tx1"/>
         </a:solidFill>
@@ -35,8 +38,8 @@
         <a:cs typeface="+mn-cs"/>
       </a:defRPr>
     </a:lvl2pPr>
-    <a:lvl3pPr marL="914400" algn="l" defTabSz="914400" rtl="0" eaLnBrk="1" latinLnBrk="0" hangingPunct="1">
-      <a:defRPr sz="1800" kern="1200">
+    <a:lvl3pPr marL="1619768" algn="l" defTabSz="1619768" rtl="0" eaLnBrk="1" latinLnBrk="0" hangingPunct="1">
+      <a:defRPr sz="3200" kern="1200">
         <a:solidFill>
           <a:schemeClr val="tx1"/>
         </a:solidFill>
@@ -45,8 +48,8 @@
         <a:cs typeface="+mn-cs"/>
       </a:defRPr>
     </a:lvl3pPr>
-    <a:lvl4pPr marL="1371600" algn="l" defTabSz="914400" rtl="0" eaLnBrk="1" latinLnBrk="0" hangingPunct="1">
-      <a:defRPr sz="1800" kern="1200">
+    <a:lvl4pPr marL="2429652" algn="l" defTabSz="1619768" rtl="0" eaLnBrk="1" latinLnBrk="0" hangingPunct="1">
+      <a:defRPr sz="3200" kern="1200">
         <a:solidFill>
           <a:schemeClr val="tx1"/>
         </a:solidFill>
@@ -55,8 +58,8 @@
         <a:cs typeface="+mn-cs"/>
       </a:defRPr>
     </a:lvl4pPr>
-    <a:lvl5pPr marL="1828800" algn="l" defTabSz="914400" rtl="0" eaLnBrk="1" latinLnBrk="0" hangingPunct="1">
-      <a:defRPr sz="1800" kern="1200">
+    <a:lvl5pPr marL="3239536" algn="l" defTabSz="1619768" rtl="0" eaLnBrk="1" latinLnBrk="0" hangingPunct="1">
+      <a:defRPr sz="3200" kern="1200">
         <a:solidFill>
           <a:schemeClr val="tx1"/>
         </a:solidFill>
@@ -65,8 +68,8 @@
         <a:cs typeface="+mn-cs"/>
       </a:defRPr>
     </a:lvl5pPr>
-    <a:lvl6pPr marL="2286000" algn="l" defTabSz="914400" rtl="0" eaLnBrk="1" latinLnBrk="0" hangingPunct="1">
-      <a:defRPr sz="1800" kern="1200">
+    <a:lvl6pPr marL="4049420" algn="l" defTabSz="1619768" rtl="0" eaLnBrk="1" latinLnBrk="0" hangingPunct="1">
+      <a:defRPr sz="3200" kern="1200">
         <a:solidFill>
           <a:schemeClr val="tx1"/>
         </a:solidFill>
@@ -75,8 +78,8 @@
         <a:cs typeface="+mn-cs"/>
       </a:defRPr>
     </a:lvl6pPr>
-    <a:lvl7pPr marL="2743200" algn="l" defTabSz="914400" rtl="0" eaLnBrk="1" latinLnBrk="0" hangingPunct="1">
-      <a:defRPr sz="1800" kern="1200">
+    <a:lvl7pPr marL="4859304" algn="l" defTabSz="1619768" rtl="0" eaLnBrk="1" latinLnBrk="0" hangingPunct="1">
+      <a:defRPr sz="3200" kern="1200">
         <a:solidFill>
           <a:schemeClr val="tx1"/>
         </a:solidFill>
@@ -85,8 +88,8 @@
         <a:cs typeface="+mn-cs"/>
       </a:defRPr>
     </a:lvl7pPr>
-    <a:lvl8pPr marL="3200400" algn="l" defTabSz="914400" rtl="0" eaLnBrk="1" latinLnBrk="0" hangingPunct="1">
-      <a:defRPr sz="1800" kern="1200">
+    <a:lvl8pPr marL="5669189" algn="l" defTabSz="1619768" rtl="0" eaLnBrk="1" latinLnBrk="0" hangingPunct="1">
+      <a:defRPr sz="3200" kern="1200">
         <a:solidFill>
           <a:schemeClr val="tx1"/>
         </a:solidFill>
@@ -95,8 +98,8 @@
         <a:cs typeface="+mn-cs"/>
       </a:defRPr>
     </a:lvl8pPr>
-    <a:lvl9pPr marL="3657600" algn="l" defTabSz="914400" rtl="0" eaLnBrk="1" latinLnBrk="0" hangingPunct="1">
-      <a:defRPr sz="1800" kern="1200">
+    <a:lvl9pPr marL="6479073" algn="l" defTabSz="1619768" rtl="0" eaLnBrk="1" latinLnBrk="0" hangingPunct="1">
+      <a:defRPr sz="3200" kern="1200">
         <a:solidFill>
           <a:schemeClr val="tx1"/>
         </a:solidFill>
@@ -138,8 +141,8 @@
         </p:nvSpPr>
         <p:spPr>
           <a:xfrm>
-            <a:off x="685800" y="2130425"/>
-            <a:ext cx="7772400" cy="1470025"/>
+            <a:off x="1371600" y="3636027"/>
+            <a:ext cx="15544800" cy="2508911"/>
           </a:xfrm>
         </p:spPr>
         <p:txBody>
@@ -166,8 +169,8 @@
         </p:nvSpPr>
         <p:spPr>
           <a:xfrm>
-            <a:off x="1371600" y="3886200"/>
-            <a:ext cx="6400800" cy="1752600"/>
+            <a:off x="2743200" y="6632629"/>
+            <a:ext cx="12801600" cy="2991185"/>
           </a:xfrm>
         </p:spPr>
         <p:txBody>
@@ -183,7 +186,7 @@
                 </a:solidFill>
               </a:defRPr>
             </a:lvl1pPr>
-            <a:lvl2pPr marL="457200" indent="0" algn="ctr">
+            <a:lvl2pPr marL="809884" indent="0" algn="ctr">
               <a:buNone/>
               <a:defRPr>
                 <a:solidFill>
@@ -193,7 +196,7 @@
                 </a:solidFill>
               </a:defRPr>
             </a:lvl2pPr>
-            <a:lvl3pPr marL="914400" indent="0" algn="ctr">
+            <a:lvl3pPr marL="1619768" indent="0" algn="ctr">
               <a:buNone/>
               <a:defRPr>
                 <a:solidFill>
@@ -203,7 +206,7 @@
                 </a:solidFill>
               </a:defRPr>
             </a:lvl3pPr>
-            <a:lvl4pPr marL="1371600" indent="0" algn="ctr">
+            <a:lvl4pPr marL="2429652" indent="0" algn="ctr">
               <a:buNone/>
               <a:defRPr>
                 <a:solidFill>
@@ -213,7 +216,7 @@
                 </a:solidFill>
               </a:defRPr>
             </a:lvl4pPr>
-            <a:lvl5pPr marL="1828800" indent="0" algn="ctr">
+            <a:lvl5pPr marL="3239536" indent="0" algn="ctr">
               <a:buNone/>
               <a:defRPr>
                 <a:solidFill>
@@ -223,7 +226,7 @@
                 </a:solidFill>
               </a:defRPr>
             </a:lvl5pPr>
-            <a:lvl6pPr marL="2286000" indent="0" algn="ctr">
+            <a:lvl6pPr marL="4049420" indent="0" algn="ctr">
               <a:buNone/>
               <a:defRPr>
                 <a:solidFill>
@@ -233,7 +236,7 @@
                 </a:solidFill>
               </a:defRPr>
             </a:lvl6pPr>
-            <a:lvl7pPr marL="2743200" indent="0" algn="ctr">
+            <a:lvl7pPr marL="4859304" indent="0" algn="ctr">
               <a:buNone/>
               <a:defRPr>
                 <a:solidFill>
@@ -243,7 +246,7 @@
                 </a:solidFill>
               </a:defRPr>
             </a:lvl7pPr>
-            <a:lvl8pPr marL="3200400" indent="0" algn="ctr">
+            <a:lvl8pPr marL="5669189" indent="0" algn="ctr">
               <a:buNone/>
               <a:defRPr>
                 <a:solidFill>
@@ -253,7 +256,7 @@
                 </a:solidFill>
               </a:defRPr>
             </a:lvl8pPr>
-            <a:lvl9pPr marL="3657600" indent="0" algn="ctr">
+            <a:lvl9pPr marL="6479073" indent="0" algn="ctr">
               <a:buNone/>
               <a:defRPr>
                 <a:solidFill>
@@ -291,7 +294,7 @@
             <a:fld id="{1D8BD707-D9CF-40AE-B4C6-C98DA3205C09}" type="datetimeFigureOut">
               <a:rPr lang="en-US" smtClean="0"/>
               <a:pPr/>
-              <a:t>20-Jan-19</a:t>
+              <a:t>24-Jan-19</a:t>
             </a:fld>
             <a:endParaRPr lang="en-US"/>
           </a:p>
@@ -458,7 +461,7 @@
             <a:fld id="{1D8BD707-D9CF-40AE-B4C6-C98DA3205C09}" type="datetimeFigureOut">
               <a:rPr lang="en-US" smtClean="0"/>
               <a:pPr/>
-              <a:t>20-Jan-19</a:t>
+              <a:t>24-Jan-19</a:t>
             </a:fld>
             <a:endParaRPr lang="en-US"/>
           </a:p>
@@ -544,8 +547,8 @@
         </p:nvSpPr>
         <p:spPr>
           <a:xfrm>
-            <a:off x="6629400" y="274638"/>
-            <a:ext cx="2057400" cy="5851525"/>
+            <a:off x="13258800" y="468732"/>
+            <a:ext cx="4114800" cy="9986873"/>
           </a:xfrm>
         </p:spPr>
         <p:txBody>
@@ -572,8 +575,8 @@
         </p:nvSpPr>
         <p:spPr>
           <a:xfrm>
-            <a:off x="457200" y="274638"/>
-            <a:ext cx="6019800" cy="5851525"/>
+            <a:off x="914400" y="468732"/>
+            <a:ext cx="12039600" cy="9986873"/>
           </a:xfrm>
         </p:spPr>
         <p:txBody>
@@ -635,7 +638,7 @@
             <a:fld id="{1D8BD707-D9CF-40AE-B4C6-C98DA3205C09}" type="datetimeFigureOut">
               <a:rPr lang="en-US" smtClean="0"/>
               <a:pPr/>
-              <a:t>20-Jan-19</a:t>
+              <a:t>24-Jan-19</a:t>
             </a:fld>
             <a:endParaRPr lang="en-US"/>
           </a:p>
@@ -802,7 +805,7 @@
             <a:fld id="{1D8BD707-D9CF-40AE-B4C6-C98DA3205C09}" type="datetimeFigureOut">
               <a:rPr lang="en-US" smtClean="0"/>
               <a:pPr/>
-              <a:t>20-Jan-19</a:t>
+              <a:t>24-Jan-19</a:t>
             </a:fld>
             <a:endParaRPr lang="en-US"/>
           </a:p>
@@ -888,15 +891,15 @@
         </p:nvSpPr>
         <p:spPr>
           <a:xfrm>
-            <a:off x="722313" y="4406900"/>
-            <a:ext cx="7772400" cy="1362075"/>
+            <a:off x="1444626" y="7521314"/>
+            <a:ext cx="15544800" cy="2324672"/>
           </a:xfrm>
         </p:spPr>
         <p:txBody>
           <a:bodyPr anchor="t"/>
           <a:lstStyle>
             <a:lvl1pPr algn="l">
-              <a:defRPr sz="4000" b="1" cap="all"/>
+              <a:defRPr sz="7100" b="1" cap="all"/>
             </a:lvl1pPr>
           </a:lstStyle>
           <a:p>
@@ -920,8 +923,8 @@
         </p:nvSpPr>
         <p:spPr>
           <a:xfrm>
-            <a:off x="722313" y="2906713"/>
-            <a:ext cx="7772400" cy="1500187"/>
+            <a:off x="1444626" y="4960924"/>
+            <a:ext cx="15544800" cy="2560389"/>
           </a:xfrm>
         </p:spPr>
         <p:txBody>
@@ -929,7 +932,7 @@
           <a:lstStyle>
             <a:lvl1pPr marL="0" indent="0">
               <a:buNone/>
-              <a:defRPr sz="2000">
+              <a:defRPr sz="3500">
                 <a:solidFill>
                   <a:schemeClr val="tx1">
                     <a:tint val="75000"/>
@@ -937,9 +940,9 @@
                 </a:solidFill>
               </a:defRPr>
             </a:lvl1pPr>
-            <a:lvl2pPr marL="457200" indent="0">
-              <a:buNone/>
-              <a:defRPr sz="1800">
+            <a:lvl2pPr marL="809884" indent="0">
+              <a:buNone/>
+              <a:defRPr sz="3200">
                 <a:solidFill>
                   <a:schemeClr val="tx1">
                     <a:tint val="75000"/>
@@ -947,9 +950,9 @@
                 </a:solidFill>
               </a:defRPr>
             </a:lvl2pPr>
-            <a:lvl3pPr marL="914400" indent="0">
-              <a:buNone/>
-              <a:defRPr sz="1600">
+            <a:lvl3pPr marL="1619768" indent="0">
+              <a:buNone/>
+              <a:defRPr sz="2800">
                 <a:solidFill>
                   <a:schemeClr val="tx1">
                     <a:tint val="75000"/>
@@ -957,9 +960,9 @@
                 </a:solidFill>
               </a:defRPr>
             </a:lvl3pPr>
-            <a:lvl4pPr marL="1371600" indent="0">
-              <a:buNone/>
-              <a:defRPr sz="1400">
+            <a:lvl4pPr marL="2429652" indent="0">
+              <a:buNone/>
+              <a:defRPr sz="2500">
                 <a:solidFill>
                   <a:schemeClr val="tx1">
                     <a:tint val="75000"/>
@@ -967,9 +970,9 @@
                 </a:solidFill>
               </a:defRPr>
             </a:lvl4pPr>
-            <a:lvl5pPr marL="1828800" indent="0">
-              <a:buNone/>
-              <a:defRPr sz="1400">
+            <a:lvl5pPr marL="3239536" indent="0">
+              <a:buNone/>
+              <a:defRPr sz="2500">
                 <a:solidFill>
                   <a:schemeClr val="tx1">
                     <a:tint val="75000"/>
@@ -977,9 +980,9 @@
                 </a:solidFill>
               </a:defRPr>
             </a:lvl5pPr>
-            <a:lvl6pPr marL="2286000" indent="0">
-              <a:buNone/>
-              <a:defRPr sz="1400">
+            <a:lvl6pPr marL="4049420" indent="0">
+              <a:buNone/>
+              <a:defRPr sz="2500">
                 <a:solidFill>
                   <a:schemeClr val="tx1">
                     <a:tint val="75000"/>
@@ -987,9 +990,9 @@
                 </a:solidFill>
               </a:defRPr>
             </a:lvl6pPr>
-            <a:lvl7pPr marL="2743200" indent="0">
-              <a:buNone/>
-              <a:defRPr sz="1400">
+            <a:lvl7pPr marL="4859304" indent="0">
+              <a:buNone/>
+              <a:defRPr sz="2500">
                 <a:solidFill>
                   <a:schemeClr val="tx1">
                     <a:tint val="75000"/>
@@ -997,9 +1000,9 @@
                 </a:solidFill>
               </a:defRPr>
             </a:lvl7pPr>
-            <a:lvl8pPr marL="3200400" indent="0">
-              <a:buNone/>
-              <a:defRPr sz="1400">
+            <a:lvl8pPr marL="5669189" indent="0">
+              <a:buNone/>
+              <a:defRPr sz="2500">
                 <a:solidFill>
                   <a:schemeClr val="tx1">
                     <a:tint val="75000"/>
@@ -1007,9 +1010,9 @@
                 </a:solidFill>
               </a:defRPr>
             </a:lvl8pPr>
-            <a:lvl9pPr marL="3657600" indent="0">
-              <a:buNone/>
-              <a:defRPr sz="1400">
+            <a:lvl9pPr marL="6479073" indent="0">
+              <a:buNone/>
+              <a:defRPr sz="2500">
                 <a:solidFill>
                   <a:schemeClr val="tx1">
                     <a:tint val="75000"/>
@@ -1045,7 +1048,7 @@
             <a:fld id="{1D8BD707-D9CF-40AE-B4C6-C98DA3205C09}" type="datetimeFigureOut">
               <a:rPr lang="en-US" smtClean="0"/>
               <a:pPr/>
-              <a:t>20-Jan-19</a:t>
+              <a:t>24-Jan-19</a:t>
             </a:fld>
             <a:endParaRPr lang="en-US"/>
           </a:p>
@@ -1154,39 +1157,39 @@
         </p:nvSpPr>
         <p:spPr>
           <a:xfrm>
-            <a:off x="457200" y="1600200"/>
-            <a:ext cx="4038600" cy="4525963"/>
+            <a:off x="914400" y="2731085"/>
+            <a:ext cx="8077200" cy="7724521"/>
           </a:xfrm>
         </p:spPr>
         <p:txBody>
           <a:bodyPr/>
           <a:lstStyle>
             <a:lvl1pPr>
-              <a:defRPr sz="2800"/>
+              <a:defRPr sz="5000"/>
             </a:lvl1pPr>
             <a:lvl2pPr>
-              <a:defRPr sz="2400"/>
+              <a:defRPr sz="4300"/>
             </a:lvl2pPr>
             <a:lvl3pPr>
-              <a:defRPr sz="2000"/>
+              <a:defRPr sz="3500"/>
             </a:lvl3pPr>
             <a:lvl4pPr>
-              <a:defRPr sz="1800"/>
+              <a:defRPr sz="3200"/>
             </a:lvl4pPr>
             <a:lvl5pPr>
-              <a:defRPr sz="1800"/>
+              <a:defRPr sz="3200"/>
             </a:lvl5pPr>
             <a:lvl6pPr>
-              <a:defRPr sz="1800"/>
+              <a:defRPr sz="3200"/>
             </a:lvl6pPr>
             <a:lvl7pPr>
-              <a:defRPr sz="1800"/>
+              <a:defRPr sz="3200"/>
             </a:lvl7pPr>
             <a:lvl8pPr>
-              <a:defRPr sz="1800"/>
+              <a:defRPr sz="3200"/>
             </a:lvl8pPr>
             <a:lvl9pPr>
-              <a:defRPr sz="1800"/>
+              <a:defRPr sz="3200"/>
             </a:lvl9pPr>
           </a:lstStyle>
           <a:p>
@@ -1239,39 +1242,39 @@
         </p:nvSpPr>
         <p:spPr>
           <a:xfrm>
-            <a:off x="4648200" y="1600200"/>
-            <a:ext cx="4038600" cy="4525963"/>
+            <a:off x="9296400" y="2731085"/>
+            <a:ext cx="8077200" cy="7724521"/>
           </a:xfrm>
         </p:spPr>
         <p:txBody>
           <a:bodyPr/>
           <a:lstStyle>
             <a:lvl1pPr>
-              <a:defRPr sz="2800"/>
+              <a:defRPr sz="5000"/>
             </a:lvl1pPr>
             <a:lvl2pPr>
-              <a:defRPr sz="2400"/>
+              <a:defRPr sz="4300"/>
             </a:lvl2pPr>
             <a:lvl3pPr>
-              <a:defRPr sz="2000"/>
+              <a:defRPr sz="3500"/>
             </a:lvl3pPr>
             <a:lvl4pPr>
-              <a:defRPr sz="1800"/>
+              <a:defRPr sz="3200"/>
             </a:lvl4pPr>
             <a:lvl5pPr>
-              <a:defRPr sz="1800"/>
+              <a:defRPr sz="3200"/>
             </a:lvl5pPr>
             <a:lvl6pPr>
-              <a:defRPr sz="1800"/>
+              <a:defRPr sz="3200"/>
             </a:lvl6pPr>
             <a:lvl7pPr>
-              <a:defRPr sz="1800"/>
+              <a:defRPr sz="3200"/>
             </a:lvl7pPr>
             <a:lvl8pPr>
-              <a:defRPr sz="1800"/>
+              <a:defRPr sz="3200"/>
             </a:lvl8pPr>
             <a:lvl9pPr>
-              <a:defRPr sz="1800"/>
+              <a:defRPr sz="3200"/>
             </a:lvl9pPr>
           </a:lstStyle>
           <a:p>
@@ -1330,7 +1333,7 @@
             <a:fld id="{1D8BD707-D9CF-40AE-B4C6-C98DA3205C09}" type="datetimeFigureOut">
               <a:rPr lang="en-US" smtClean="0"/>
               <a:pPr/>
-              <a:t>20-Jan-19</a:t>
+              <a:t>24-Jan-19</a:t>
             </a:fld>
             <a:endParaRPr lang="en-US"/>
           </a:p>
@@ -1443,8 +1446,8 @@
         </p:nvSpPr>
         <p:spPr>
           <a:xfrm>
-            <a:off x="457200" y="1535113"/>
-            <a:ext cx="4040188" cy="639762"/>
+            <a:off x="914400" y="2619998"/>
+            <a:ext cx="8080376" cy="1091892"/>
           </a:xfrm>
         </p:spPr>
         <p:txBody>
@@ -1452,39 +1455,39 @@
           <a:lstStyle>
             <a:lvl1pPr marL="0" indent="0">
               <a:buNone/>
-              <a:defRPr sz="2400" b="1"/>
+              <a:defRPr sz="4300" b="1"/>
             </a:lvl1pPr>
-            <a:lvl2pPr marL="457200" indent="0">
-              <a:buNone/>
-              <a:defRPr sz="2000" b="1"/>
+            <a:lvl2pPr marL="809884" indent="0">
+              <a:buNone/>
+              <a:defRPr sz="3500" b="1"/>
             </a:lvl2pPr>
-            <a:lvl3pPr marL="914400" indent="0">
-              <a:buNone/>
-              <a:defRPr sz="1800" b="1"/>
+            <a:lvl3pPr marL="1619768" indent="0">
+              <a:buNone/>
+              <a:defRPr sz="3200" b="1"/>
             </a:lvl3pPr>
-            <a:lvl4pPr marL="1371600" indent="0">
-              <a:buNone/>
-              <a:defRPr sz="1600" b="1"/>
+            <a:lvl4pPr marL="2429652" indent="0">
+              <a:buNone/>
+              <a:defRPr sz="2800" b="1"/>
             </a:lvl4pPr>
-            <a:lvl5pPr marL="1828800" indent="0">
-              <a:buNone/>
-              <a:defRPr sz="1600" b="1"/>
+            <a:lvl5pPr marL="3239536" indent="0">
+              <a:buNone/>
+              <a:defRPr sz="2800" b="1"/>
             </a:lvl5pPr>
-            <a:lvl6pPr marL="2286000" indent="0">
-              <a:buNone/>
-              <a:defRPr sz="1600" b="1"/>
+            <a:lvl6pPr marL="4049420" indent="0">
+              <a:buNone/>
+              <a:defRPr sz="2800" b="1"/>
             </a:lvl6pPr>
-            <a:lvl7pPr marL="2743200" indent="0">
-              <a:buNone/>
-              <a:defRPr sz="1600" b="1"/>
+            <a:lvl7pPr marL="4859304" indent="0">
+              <a:buNone/>
+              <a:defRPr sz="2800" b="1"/>
             </a:lvl7pPr>
-            <a:lvl8pPr marL="3200400" indent="0">
-              <a:buNone/>
-              <a:defRPr sz="1600" b="1"/>
+            <a:lvl8pPr marL="5669189" indent="0">
+              <a:buNone/>
+              <a:defRPr sz="2800" b="1"/>
             </a:lvl8pPr>
-            <a:lvl9pPr marL="3657600" indent="0">
-              <a:buNone/>
-              <a:defRPr sz="1600" b="1"/>
+            <a:lvl9pPr marL="6479073" indent="0">
+              <a:buNone/>
+              <a:defRPr sz="2800" b="1"/>
             </a:lvl9pPr>
           </a:lstStyle>
           <a:p>
@@ -1508,39 +1511,39 @@
         </p:nvSpPr>
         <p:spPr>
           <a:xfrm>
-            <a:off x="457200" y="2174875"/>
-            <a:ext cx="4040188" cy="3951288"/>
+            <a:off x="914400" y="3711890"/>
+            <a:ext cx="8080376" cy="6743713"/>
           </a:xfrm>
         </p:spPr>
         <p:txBody>
           <a:bodyPr/>
           <a:lstStyle>
             <a:lvl1pPr>
-              <a:defRPr sz="2400"/>
+              <a:defRPr sz="4300"/>
             </a:lvl1pPr>
             <a:lvl2pPr>
-              <a:defRPr sz="2000"/>
+              <a:defRPr sz="3500"/>
             </a:lvl2pPr>
             <a:lvl3pPr>
-              <a:defRPr sz="1800"/>
+              <a:defRPr sz="3200"/>
             </a:lvl3pPr>
             <a:lvl4pPr>
-              <a:defRPr sz="1600"/>
+              <a:defRPr sz="2800"/>
             </a:lvl4pPr>
             <a:lvl5pPr>
-              <a:defRPr sz="1600"/>
+              <a:defRPr sz="2800"/>
             </a:lvl5pPr>
             <a:lvl6pPr>
-              <a:defRPr sz="1600"/>
+              <a:defRPr sz="2800"/>
             </a:lvl6pPr>
             <a:lvl7pPr>
-              <a:defRPr sz="1600"/>
+              <a:defRPr sz="2800"/>
             </a:lvl7pPr>
             <a:lvl8pPr>
-              <a:defRPr sz="1600"/>
+              <a:defRPr sz="2800"/>
             </a:lvl8pPr>
             <a:lvl9pPr>
-              <a:defRPr sz="1600"/>
+              <a:defRPr sz="2800"/>
             </a:lvl9pPr>
           </a:lstStyle>
           <a:p>
@@ -1593,8 +1596,8 @@
         </p:nvSpPr>
         <p:spPr>
           <a:xfrm>
-            <a:off x="4645025" y="1535113"/>
-            <a:ext cx="4041775" cy="639762"/>
+            <a:off x="9290051" y="2619998"/>
+            <a:ext cx="8083550" cy="1091892"/>
           </a:xfrm>
         </p:spPr>
         <p:txBody>
@@ -1602,39 +1605,39 @@
           <a:lstStyle>
             <a:lvl1pPr marL="0" indent="0">
               <a:buNone/>
-              <a:defRPr sz="2400" b="1"/>
+              <a:defRPr sz="4300" b="1"/>
             </a:lvl1pPr>
-            <a:lvl2pPr marL="457200" indent="0">
-              <a:buNone/>
-              <a:defRPr sz="2000" b="1"/>
+            <a:lvl2pPr marL="809884" indent="0">
+              <a:buNone/>
+              <a:defRPr sz="3500" b="1"/>
             </a:lvl2pPr>
-            <a:lvl3pPr marL="914400" indent="0">
-              <a:buNone/>
-              <a:defRPr sz="1800" b="1"/>
+            <a:lvl3pPr marL="1619768" indent="0">
+              <a:buNone/>
+              <a:defRPr sz="3200" b="1"/>
             </a:lvl3pPr>
-            <a:lvl4pPr marL="1371600" indent="0">
-              <a:buNone/>
-              <a:defRPr sz="1600" b="1"/>
+            <a:lvl4pPr marL="2429652" indent="0">
+              <a:buNone/>
+              <a:defRPr sz="2800" b="1"/>
             </a:lvl4pPr>
-            <a:lvl5pPr marL="1828800" indent="0">
-              <a:buNone/>
-              <a:defRPr sz="1600" b="1"/>
+            <a:lvl5pPr marL="3239536" indent="0">
+              <a:buNone/>
+              <a:defRPr sz="2800" b="1"/>
             </a:lvl5pPr>
-            <a:lvl6pPr marL="2286000" indent="0">
-              <a:buNone/>
-              <a:defRPr sz="1600" b="1"/>
+            <a:lvl6pPr marL="4049420" indent="0">
+              <a:buNone/>
+              <a:defRPr sz="2800" b="1"/>
             </a:lvl6pPr>
-            <a:lvl7pPr marL="2743200" indent="0">
-              <a:buNone/>
-              <a:defRPr sz="1600" b="1"/>
+            <a:lvl7pPr marL="4859304" indent="0">
+              <a:buNone/>
+              <a:defRPr sz="2800" b="1"/>
             </a:lvl7pPr>
-            <a:lvl8pPr marL="3200400" indent="0">
-              <a:buNone/>
-              <a:defRPr sz="1600" b="1"/>
+            <a:lvl8pPr marL="5669189" indent="0">
+              <a:buNone/>
+              <a:defRPr sz="2800" b="1"/>
             </a:lvl8pPr>
-            <a:lvl9pPr marL="3657600" indent="0">
-              <a:buNone/>
-              <a:defRPr sz="1600" b="1"/>
+            <a:lvl9pPr marL="6479073" indent="0">
+              <a:buNone/>
+              <a:defRPr sz="2800" b="1"/>
             </a:lvl9pPr>
           </a:lstStyle>
           <a:p>
@@ -1658,39 +1661,39 @@
         </p:nvSpPr>
         <p:spPr>
           <a:xfrm>
-            <a:off x="4645025" y="2174875"/>
-            <a:ext cx="4041775" cy="3951288"/>
+            <a:off x="9290051" y="3711890"/>
+            <a:ext cx="8083550" cy="6743713"/>
           </a:xfrm>
         </p:spPr>
         <p:txBody>
           <a:bodyPr/>
           <a:lstStyle>
             <a:lvl1pPr>
-              <a:defRPr sz="2400"/>
+              <a:defRPr sz="4300"/>
             </a:lvl1pPr>
             <a:lvl2pPr>
-              <a:defRPr sz="2000"/>
+              <a:defRPr sz="3500"/>
             </a:lvl2pPr>
             <a:lvl3pPr>
-              <a:defRPr sz="1800"/>
+              <a:defRPr sz="3200"/>
             </a:lvl3pPr>
             <a:lvl4pPr>
-              <a:defRPr sz="1600"/>
+              <a:defRPr sz="2800"/>
             </a:lvl4pPr>
             <a:lvl5pPr>
-              <a:defRPr sz="1600"/>
+              <a:defRPr sz="2800"/>
             </a:lvl5pPr>
             <a:lvl6pPr>
-              <a:defRPr sz="1600"/>
+              <a:defRPr sz="2800"/>
             </a:lvl6pPr>
             <a:lvl7pPr>
-              <a:defRPr sz="1600"/>
+              <a:defRPr sz="2800"/>
             </a:lvl7pPr>
             <a:lvl8pPr>
-              <a:defRPr sz="1600"/>
+              <a:defRPr sz="2800"/>
             </a:lvl8pPr>
             <a:lvl9pPr>
-              <a:defRPr sz="1600"/>
+              <a:defRPr sz="2800"/>
             </a:lvl9pPr>
           </a:lstStyle>
           <a:p>
@@ -1749,7 +1752,7 @@
             <a:fld id="{1D8BD707-D9CF-40AE-B4C6-C98DA3205C09}" type="datetimeFigureOut">
               <a:rPr lang="en-US" smtClean="0"/>
               <a:pPr/>
-              <a:t>20-Jan-19</a:t>
+              <a:t>24-Jan-19</a:t>
             </a:fld>
             <a:endParaRPr lang="en-US"/>
           </a:p>
@@ -1864,7 +1867,7 @@
             <a:fld id="{1D8BD707-D9CF-40AE-B4C6-C98DA3205C09}" type="datetimeFigureOut">
               <a:rPr lang="en-US" smtClean="0"/>
               <a:pPr/>
-              <a:t>20-Jan-19</a:t>
+              <a:t>24-Jan-19</a:t>
             </a:fld>
             <a:endParaRPr lang="en-US"/>
           </a:p>
@@ -1956,7 +1959,7 @@
             <a:fld id="{1D8BD707-D9CF-40AE-B4C6-C98DA3205C09}" type="datetimeFigureOut">
               <a:rPr lang="en-US" smtClean="0"/>
               <a:pPr/>
-              <a:t>20-Jan-19</a:t>
+              <a:t>24-Jan-19</a:t>
             </a:fld>
             <a:endParaRPr lang="en-US"/>
           </a:p>
@@ -2042,15 +2045,15 @@
         </p:nvSpPr>
         <p:spPr>
           <a:xfrm>
-            <a:off x="457200" y="273050"/>
-            <a:ext cx="3008313" cy="1162050"/>
+            <a:off x="914401" y="466018"/>
+            <a:ext cx="6016626" cy="1983286"/>
           </a:xfrm>
         </p:spPr>
         <p:txBody>
           <a:bodyPr anchor="b"/>
           <a:lstStyle>
             <a:lvl1pPr algn="l">
-              <a:defRPr sz="2000" b="1"/>
+              <a:defRPr sz="3500" b="1"/>
             </a:lvl1pPr>
           </a:lstStyle>
           <a:p>
@@ -2074,39 +2077,39 @@
         </p:nvSpPr>
         <p:spPr>
           <a:xfrm>
-            <a:off x="3575050" y="273050"/>
-            <a:ext cx="5111750" cy="5853113"/>
+            <a:off x="7150100" y="466017"/>
+            <a:ext cx="10223500" cy="9989587"/>
           </a:xfrm>
         </p:spPr>
         <p:txBody>
           <a:bodyPr/>
           <a:lstStyle>
             <a:lvl1pPr>
-              <a:defRPr sz="3200"/>
+              <a:defRPr sz="5700"/>
             </a:lvl1pPr>
             <a:lvl2pPr>
-              <a:defRPr sz="2800"/>
+              <a:defRPr sz="5000"/>
             </a:lvl2pPr>
             <a:lvl3pPr>
-              <a:defRPr sz="2400"/>
+              <a:defRPr sz="4300"/>
             </a:lvl3pPr>
             <a:lvl4pPr>
-              <a:defRPr sz="2000"/>
+              <a:defRPr sz="3500"/>
             </a:lvl4pPr>
             <a:lvl5pPr>
-              <a:defRPr sz="2000"/>
+              <a:defRPr sz="3500"/>
             </a:lvl5pPr>
             <a:lvl6pPr>
-              <a:defRPr sz="2000"/>
+              <a:defRPr sz="3500"/>
             </a:lvl6pPr>
             <a:lvl7pPr>
-              <a:defRPr sz="2000"/>
+              <a:defRPr sz="3500"/>
             </a:lvl7pPr>
             <a:lvl8pPr>
-              <a:defRPr sz="2000"/>
+              <a:defRPr sz="3500"/>
             </a:lvl8pPr>
             <a:lvl9pPr>
-              <a:defRPr sz="2000"/>
+              <a:defRPr sz="3500"/>
             </a:lvl9pPr>
           </a:lstStyle>
           <a:p>
@@ -2159,8 +2162,8 @@
         </p:nvSpPr>
         <p:spPr>
           <a:xfrm>
-            <a:off x="457200" y="1435100"/>
-            <a:ext cx="3008313" cy="4691063"/>
+            <a:off x="914401" y="2449305"/>
+            <a:ext cx="6016626" cy="8006300"/>
           </a:xfrm>
         </p:spPr>
         <p:txBody>
@@ -2168,39 +2171,39 @@
           <a:lstStyle>
             <a:lvl1pPr marL="0" indent="0">
               <a:buNone/>
-              <a:defRPr sz="1400"/>
+              <a:defRPr sz="2500"/>
             </a:lvl1pPr>
-            <a:lvl2pPr marL="457200" indent="0">
-              <a:buNone/>
-              <a:defRPr sz="1200"/>
+            <a:lvl2pPr marL="809884" indent="0">
+              <a:buNone/>
+              <a:defRPr sz="2100"/>
             </a:lvl2pPr>
-            <a:lvl3pPr marL="914400" indent="0">
-              <a:buNone/>
-              <a:defRPr sz="1000"/>
+            <a:lvl3pPr marL="1619768" indent="0">
+              <a:buNone/>
+              <a:defRPr sz="1800"/>
             </a:lvl3pPr>
-            <a:lvl4pPr marL="1371600" indent="0">
-              <a:buNone/>
-              <a:defRPr sz="900"/>
+            <a:lvl4pPr marL="2429652" indent="0">
+              <a:buNone/>
+              <a:defRPr sz="1600"/>
             </a:lvl4pPr>
-            <a:lvl5pPr marL="1828800" indent="0">
-              <a:buNone/>
-              <a:defRPr sz="900"/>
+            <a:lvl5pPr marL="3239536" indent="0">
+              <a:buNone/>
+              <a:defRPr sz="1600"/>
             </a:lvl5pPr>
-            <a:lvl6pPr marL="2286000" indent="0">
-              <a:buNone/>
-              <a:defRPr sz="900"/>
+            <a:lvl6pPr marL="4049420" indent="0">
+              <a:buNone/>
+              <a:defRPr sz="1600"/>
             </a:lvl6pPr>
-            <a:lvl7pPr marL="2743200" indent="0">
-              <a:buNone/>
-              <a:defRPr sz="900"/>
+            <a:lvl7pPr marL="4859304" indent="0">
+              <a:buNone/>
+              <a:defRPr sz="1600"/>
             </a:lvl7pPr>
-            <a:lvl8pPr marL="3200400" indent="0">
-              <a:buNone/>
-              <a:defRPr sz="900"/>
+            <a:lvl8pPr marL="5669189" indent="0">
+              <a:buNone/>
+              <a:defRPr sz="1600"/>
             </a:lvl8pPr>
-            <a:lvl9pPr marL="3657600" indent="0">
-              <a:buNone/>
-              <a:defRPr sz="900"/>
+            <a:lvl9pPr marL="6479073" indent="0">
+              <a:buNone/>
+              <a:defRPr sz="1600"/>
             </a:lvl9pPr>
           </a:lstStyle>
           <a:p>
@@ -2230,7 +2233,7 @@
             <a:fld id="{1D8BD707-D9CF-40AE-B4C6-C98DA3205C09}" type="datetimeFigureOut">
               <a:rPr lang="en-US" smtClean="0"/>
               <a:pPr/>
-              <a:t>20-Jan-19</a:t>
+              <a:t>24-Jan-19</a:t>
             </a:fld>
             <a:endParaRPr lang="en-US"/>
           </a:p>
@@ -2316,15 +2319,15 @@
         </p:nvSpPr>
         <p:spPr>
           <a:xfrm>
-            <a:off x="1792288" y="4800600"/>
-            <a:ext cx="5486400" cy="566738"/>
+            <a:off x="3584576" y="8193247"/>
+            <a:ext cx="10972800" cy="967260"/>
           </a:xfrm>
         </p:spPr>
         <p:txBody>
           <a:bodyPr anchor="b"/>
           <a:lstStyle>
             <a:lvl1pPr algn="l">
-              <a:defRPr sz="2000" b="1"/>
+              <a:defRPr sz="3500" b="1"/>
             </a:lvl1pPr>
           </a:lstStyle>
           <a:p>
@@ -2348,8 +2351,8 @@
         </p:nvSpPr>
         <p:spPr>
           <a:xfrm>
-            <a:off x="1792288" y="612775"/>
-            <a:ext cx="5486400" cy="4114800"/>
+            <a:off x="3584576" y="1045832"/>
+            <a:ext cx="10972800" cy="7022783"/>
           </a:xfrm>
         </p:spPr>
         <p:txBody>
@@ -2357,39 +2360,39 @@
           <a:lstStyle>
             <a:lvl1pPr marL="0" indent="0">
               <a:buNone/>
-              <a:defRPr sz="3200"/>
+              <a:defRPr sz="5700"/>
             </a:lvl1pPr>
-            <a:lvl2pPr marL="457200" indent="0">
-              <a:buNone/>
-              <a:defRPr sz="2800"/>
+            <a:lvl2pPr marL="809884" indent="0">
+              <a:buNone/>
+              <a:defRPr sz="5000"/>
             </a:lvl2pPr>
-            <a:lvl3pPr marL="914400" indent="0">
-              <a:buNone/>
-              <a:defRPr sz="2400"/>
+            <a:lvl3pPr marL="1619768" indent="0">
+              <a:buNone/>
+              <a:defRPr sz="4300"/>
             </a:lvl3pPr>
-            <a:lvl4pPr marL="1371600" indent="0">
-              <a:buNone/>
-              <a:defRPr sz="2000"/>
+            <a:lvl4pPr marL="2429652" indent="0">
+              <a:buNone/>
+              <a:defRPr sz="3500"/>
             </a:lvl4pPr>
-            <a:lvl5pPr marL="1828800" indent="0">
-              <a:buNone/>
-              <a:defRPr sz="2000"/>
+            <a:lvl5pPr marL="3239536" indent="0">
+              <a:buNone/>
+              <a:defRPr sz="3500"/>
             </a:lvl5pPr>
-            <a:lvl6pPr marL="2286000" indent="0">
-              <a:buNone/>
-              <a:defRPr sz="2000"/>
+            <a:lvl6pPr marL="4049420" indent="0">
+              <a:buNone/>
+              <a:defRPr sz="3500"/>
             </a:lvl6pPr>
-            <a:lvl7pPr marL="2743200" indent="0">
-              <a:buNone/>
-              <a:defRPr sz="2000"/>
+            <a:lvl7pPr marL="4859304" indent="0">
+              <a:buNone/>
+              <a:defRPr sz="3500"/>
             </a:lvl7pPr>
-            <a:lvl8pPr marL="3200400" indent="0">
-              <a:buNone/>
-              <a:defRPr sz="2000"/>
+            <a:lvl8pPr marL="5669189" indent="0">
+              <a:buNone/>
+              <a:defRPr sz="3500"/>
             </a:lvl8pPr>
-            <a:lvl9pPr marL="3657600" indent="0">
-              <a:buNone/>
-              <a:defRPr sz="2000"/>
+            <a:lvl9pPr marL="6479073" indent="0">
+              <a:buNone/>
+              <a:defRPr sz="3500"/>
             </a:lvl9pPr>
           </a:lstStyle>
           <a:p>
@@ -2409,8 +2412,8 @@
         </p:nvSpPr>
         <p:spPr>
           <a:xfrm>
-            <a:off x="1792288" y="5367338"/>
-            <a:ext cx="5486400" cy="804862"/>
+            <a:off x="3584576" y="9160507"/>
+            <a:ext cx="10972800" cy="1373668"/>
           </a:xfrm>
         </p:spPr>
         <p:txBody>
@@ -2418,39 +2421,39 @@
           <a:lstStyle>
             <a:lvl1pPr marL="0" indent="0">
               <a:buNone/>
-              <a:defRPr sz="1400"/>
+              <a:defRPr sz="2500"/>
             </a:lvl1pPr>
-            <a:lvl2pPr marL="457200" indent="0">
-              <a:buNone/>
-              <a:defRPr sz="1200"/>
+            <a:lvl2pPr marL="809884" indent="0">
+              <a:buNone/>
+              <a:defRPr sz="2100"/>
             </a:lvl2pPr>
-            <a:lvl3pPr marL="914400" indent="0">
-              <a:buNone/>
-              <a:defRPr sz="1000"/>
+            <a:lvl3pPr marL="1619768" indent="0">
+              <a:buNone/>
+              <a:defRPr sz="1800"/>
             </a:lvl3pPr>
-            <a:lvl4pPr marL="1371600" indent="0">
-              <a:buNone/>
-              <a:defRPr sz="900"/>
+            <a:lvl4pPr marL="2429652" indent="0">
+              <a:buNone/>
+              <a:defRPr sz="1600"/>
             </a:lvl4pPr>
-            <a:lvl5pPr marL="1828800" indent="0">
-              <a:buNone/>
-              <a:defRPr sz="900"/>
+            <a:lvl5pPr marL="3239536" indent="0">
+              <a:buNone/>
+              <a:defRPr sz="1600"/>
             </a:lvl5pPr>
-            <a:lvl6pPr marL="2286000" indent="0">
-              <a:buNone/>
-              <a:defRPr sz="900"/>
+            <a:lvl6pPr marL="4049420" indent="0">
+              <a:buNone/>
+              <a:defRPr sz="1600"/>
             </a:lvl6pPr>
-            <a:lvl7pPr marL="2743200" indent="0">
-              <a:buNone/>
-              <a:defRPr sz="900"/>
+            <a:lvl7pPr marL="4859304" indent="0">
+              <a:buNone/>
+              <a:defRPr sz="1600"/>
             </a:lvl7pPr>
-            <a:lvl8pPr marL="3200400" indent="0">
-              <a:buNone/>
-              <a:defRPr sz="900"/>
+            <a:lvl8pPr marL="5669189" indent="0">
+              <a:buNone/>
+              <a:defRPr sz="1600"/>
             </a:lvl8pPr>
-            <a:lvl9pPr marL="3657600" indent="0">
-              <a:buNone/>
-              <a:defRPr sz="900"/>
+            <a:lvl9pPr marL="6479073" indent="0">
+              <a:buNone/>
+              <a:defRPr sz="1600"/>
             </a:lvl9pPr>
           </a:lstStyle>
           <a:p>
@@ -2480,7 +2483,7 @@
             <a:fld id="{1D8BD707-D9CF-40AE-B4C6-C98DA3205C09}" type="datetimeFigureOut">
               <a:rPr lang="en-US" smtClean="0"/>
               <a:pPr/>
-              <a:t>20-Jan-19</a:t>
+              <a:t>24-Jan-19</a:t>
             </a:fld>
             <a:endParaRPr lang="en-US"/>
           </a:p>
@@ -2571,15 +2574,15 @@
         </p:nvSpPr>
         <p:spPr>
           <a:xfrm>
-            <a:off x="457200" y="274638"/>
-            <a:ext cx="8229600" cy="1143000"/>
+            <a:off x="914400" y="468728"/>
+            <a:ext cx="16459200" cy="1950773"/>
           </a:xfrm>
           <a:prstGeom prst="rect">
             <a:avLst/>
           </a:prstGeom>
         </p:spPr>
         <p:txBody>
-          <a:bodyPr vert="horz" lIns="91440" tIns="45720" rIns="91440" bIns="45720" rtlCol="0" anchor="ctr">
+          <a:bodyPr vert="horz" lIns="161977" tIns="80988" rIns="161977" bIns="80988" rtlCol="0" anchor="ctr">
             <a:normAutofit/>
           </a:bodyPr>
           <a:lstStyle/>
@@ -2604,15 +2607,15 @@
         </p:nvSpPr>
         <p:spPr>
           <a:xfrm>
-            <a:off x="457200" y="1600200"/>
-            <a:ext cx="8229600" cy="4525963"/>
+            <a:off x="914400" y="2731085"/>
+            <a:ext cx="16459200" cy="7724521"/>
           </a:xfrm>
           <a:prstGeom prst="rect">
             <a:avLst/>
           </a:prstGeom>
         </p:spPr>
         <p:txBody>
-          <a:bodyPr vert="horz" lIns="91440" tIns="45720" rIns="91440" bIns="45720" rtlCol="0">
+          <a:bodyPr vert="horz" lIns="161977" tIns="80988" rIns="161977" bIns="80988" rtlCol="0">
             <a:normAutofit/>
           </a:bodyPr>
           <a:lstStyle/>
@@ -2666,18 +2669,18 @@
         </p:nvSpPr>
         <p:spPr>
           <a:xfrm>
-            <a:off x="457200" y="6356350"/>
-            <a:ext cx="2133600" cy="365125"/>
+            <a:off x="914400" y="10848469"/>
+            <a:ext cx="4267200" cy="623163"/>
           </a:xfrm>
           <a:prstGeom prst="rect">
             <a:avLst/>
           </a:prstGeom>
         </p:spPr>
         <p:txBody>
-          <a:bodyPr vert="horz" lIns="91440" tIns="45720" rIns="91440" bIns="45720" rtlCol="0" anchor="ctr"/>
+          <a:bodyPr vert="horz" lIns="161977" tIns="80988" rIns="161977" bIns="80988" rtlCol="0" anchor="ctr"/>
           <a:lstStyle>
             <a:lvl1pPr algn="l">
-              <a:defRPr sz="1200">
+              <a:defRPr sz="2100">
                 <a:solidFill>
                   <a:schemeClr val="tx1">
                     <a:tint val="75000"/>
@@ -2690,7 +2693,7 @@
             <a:fld id="{1D8BD707-D9CF-40AE-B4C6-C98DA3205C09}" type="datetimeFigureOut">
               <a:rPr lang="en-US" smtClean="0"/>
               <a:pPr/>
-              <a:t>20-Jan-19</a:t>
+              <a:t>24-Jan-19</a:t>
             </a:fld>
             <a:endParaRPr lang="en-US"/>
           </a:p>
@@ -2708,18 +2711,18 @@
         </p:nvSpPr>
         <p:spPr>
           <a:xfrm>
-            <a:off x="3124200" y="6356350"/>
-            <a:ext cx="2895600" cy="365125"/>
+            <a:off x="6248400" y="10848469"/>
+            <a:ext cx="5791200" cy="623163"/>
           </a:xfrm>
           <a:prstGeom prst="rect">
             <a:avLst/>
           </a:prstGeom>
         </p:spPr>
         <p:txBody>
-          <a:bodyPr vert="horz" lIns="91440" tIns="45720" rIns="91440" bIns="45720" rtlCol="0" anchor="ctr"/>
+          <a:bodyPr vert="horz" lIns="161977" tIns="80988" rIns="161977" bIns="80988" rtlCol="0" anchor="ctr"/>
           <a:lstStyle>
             <a:lvl1pPr algn="ctr">
-              <a:defRPr sz="1200">
+              <a:defRPr sz="2100">
                 <a:solidFill>
                   <a:schemeClr val="tx1">
                     <a:tint val="75000"/>
@@ -2745,18 +2748,18 @@
         </p:nvSpPr>
         <p:spPr>
           <a:xfrm>
-            <a:off x="6553200" y="6356350"/>
-            <a:ext cx="2133600" cy="365125"/>
+            <a:off x="13106400" y="10848469"/>
+            <a:ext cx="4267200" cy="623163"/>
           </a:xfrm>
           <a:prstGeom prst="rect">
             <a:avLst/>
           </a:prstGeom>
         </p:spPr>
         <p:txBody>
-          <a:bodyPr vert="horz" lIns="91440" tIns="45720" rIns="91440" bIns="45720" rtlCol="0" anchor="ctr"/>
+          <a:bodyPr vert="horz" lIns="161977" tIns="80988" rIns="161977" bIns="80988" rtlCol="0" anchor="ctr"/>
           <a:lstStyle>
             <a:lvl1pPr algn="r">
-              <a:defRPr sz="1200">
+              <a:defRPr sz="2100">
                 <a:solidFill>
                   <a:schemeClr val="tx1">
                     <a:tint val="75000"/>
@@ -2793,12 +2796,12 @@
   </p:sldLayoutIdLst>
   <p:txStyles>
     <p:titleStyle>
-      <a:lvl1pPr algn="ctr" defTabSz="914400" rtl="0" eaLnBrk="1" latinLnBrk="0" hangingPunct="1">
+      <a:lvl1pPr algn="ctr" defTabSz="1619768" rtl="0" eaLnBrk="1" latinLnBrk="0" hangingPunct="1">
         <a:spcBef>
           <a:spcPct val="0"/>
         </a:spcBef>
         <a:buNone/>
-        <a:defRPr sz="4400" kern="1200">
+        <a:defRPr sz="7800" kern="1200">
           <a:solidFill>
             <a:schemeClr val="tx1"/>
           </a:solidFill>
@@ -2809,13 +2812,13 @@
       </a:lvl1pPr>
     </p:titleStyle>
     <p:bodyStyle>
-      <a:lvl1pPr marL="342900" indent="-342900" algn="l" defTabSz="914400" rtl="0" eaLnBrk="1" latinLnBrk="0" hangingPunct="1">
+      <a:lvl1pPr marL="607413" indent="-607413" algn="l" defTabSz="1619768" rtl="0" eaLnBrk="1" latinLnBrk="0" hangingPunct="1">
         <a:spcBef>
           <a:spcPct val="20000"/>
         </a:spcBef>
         <a:buFont typeface="Arial" pitchFamily="34" charset="0"/>
         <a:buChar char="•"/>
-        <a:defRPr sz="3200" kern="1200">
+        <a:defRPr sz="5700" kern="1200">
           <a:solidFill>
             <a:schemeClr val="tx1"/>
           </a:solidFill>
@@ -2824,13 +2827,13 @@
           <a:cs typeface="+mn-cs"/>
         </a:defRPr>
       </a:lvl1pPr>
-      <a:lvl2pPr marL="742950" indent="-285750" algn="l" defTabSz="914400" rtl="0" eaLnBrk="1" latinLnBrk="0" hangingPunct="1">
+      <a:lvl2pPr marL="1316062" indent="-506178" algn="l" defTabSz="1619768" rtl="0" eaLnBrk="1" latinLnBrk="0" hangingPunct="1">
         <a:spcBef>
           <a:spcPct val="20000"/>
         </a:spcBef>
         <a:buFont typeface="Arial" pitchFamily="34" charset="0"/>
         <a:buChar char="–"/>
-        <a:defRPr sz="2800" kern="1200">
+        <a:defRPr sz="5000" kern="1200">
           <a:solidFill>
             <a:schemeClr val="tx1"/>
           </a:solidFill>
@@ -2839,13 +2842,13 @@
           <a:cs typeface="+mn-cs"/>
         </a:defRPr>
       </a:lvl2pPr>
-      <a:lvl3pPr marL="1143000" indent="-228600" algn="l" defTabSz="914400" rtl="0" eaLnBrk="1" latinLnBrk="0" hangingPunct="1">
+      <a:lvl3pPr marL="2024710" indent="-404942" algn="l" defTabSz="1619768" rtl="0" eaLnBrk="1" latinLnBrk="0" hangingPunct="1">
         <a:spcBef>
           <a:spcPct val="20000"/>
         </a:spcBef>
         <a:buFont typeface="Arial" pitchFamily="34" charset="0"/>
         <a:buChar char="•"/>
-        <a:defRPr sz="2400" kern="1200">
+        <a:defRPr sz="4300" kern="1200">
           <a:solidFill>
             <a:schemeClr val="tx1"/>
           </a:solidFill>
@@ -2854,13 +2857,13 @@
           <a:cs typeface="+mn-cs"/>
         </a:defRPr>
       </a:lvl3pPr>
-      <a:lvl4pPr marL="1600200" indent="-228600" algn="l" defTabSz="914400" rtl="0" eaLnBrk="1" latinLnBrk="0" hangingPunct="1">
+      <a:lvl4pPr marL="2834594" indent="-404942" algn="l" defTabSz="1619768" rtl="0" eaLnBrk="1" latinLnBrk="0" hangingPunct="1">
         <a:spcBef>
           <a:spcPct val="20000"/>
         </a:spcBef>
         <a:buFont typeface="Arial" pitchFamily="34" charset="0"/>
         <a:buChar char="–"/>
-        <a:defRPr sz="2000" kern="1200">
+        <a:defRPr sz="3500" kern="1200">
           <a:solidFill>
             <a:schemeClr val="tx1"/>
           </a:solidFill>
@@ -2869,13 +2872,13 @@
           <a:cs typeface="+mn-cs"/>
         </a:defRPr>
       </a:lvl4pPr>
-      <a:lvl5pPr marL="2057400" indent="-228600" algn="l" defTabSz="914400" rtl="0" eaLnBrk="1" latinLnBrk="0" hangingPunct="1">
+      <a:lvl5pPr marL="3644478" indent="-404942" algn="l" defTabSz="1619768" rtl="0" eaLnBrk="1" latinLnBrk="0" hangingPunct="1">
         <a:spcBef>
           <a:spcPct val="20000"/>
         </a:spcBef>
         <a:buFont typeface="Arial" pitchFamily="34" charset="0"/>
         <a:buChar char="»"/>
-        <a:defRPr sz="2000" kern="1200">
+        <a:defRPr sz="3500" kern="1200">
           <a:solidFill>
             <a:schemeClr val="tx1"/>
           </a:solidFill>
@@ -2884,13 +2887,13 @@
           <a:cs typeface="+mn-cs"/>
         </a:defRPr>
       </a:lvl5pPr>
-      <a:lvl6pPr marL="2514600" indent="-228600" algn="l" defTabSz="914400" rtl="0" eaLnBrk="1" latinLnBrk="0" hangingPunct="1">
+      <a:lvl6pPr marL="4454362" indent="-404942" algn="l" defTabSz="1619768" rtl="0" eaLnBrk="1" latinLnBrk="0" hangingPunct="1">
         <a:spcBef>
           <a:spcPct val="20000"/>
         </a:spcBef>
         <a:buFont typeface="Arial" pitchFamily="34" charset="0"/>
         <a:buChar char="•"/>
-        <a:defRPr sz="2000" kern="1200">
+        <a:defRPr sz="3500" kern="1200">
           <a:solidFill>
             <a:schemeClr val="tx1"/>
           </a:solidFill>
@@ -2899,13 +2902,13 @@
           <a:cs typeface="+mn-cs"/>
         </a:defRPr>
       </a:lvl6pPr>
-      <a:lvl7pPr marL="2971800" indent="-228600" algn="l" defTabSz="914400" rtl="0" eaLnBrk="1" latinLnBrk="0" hangingPunct="1">
+      <a:lvl7pPr marL="5264247" indent="-404942" algn="l" defTabSz="1619768" rtl="0" eaLnBrk="1" latinLnBrk="0" hangingPunct="1">
         <a:spcBef>
           <a:spcPct val="20000"/>
         </a:spcBef>
         <a:buFont typeface="Arial" pitchFamily="34" charset="0"/>
         <a:buChar char="•"/>
-        <a:defRPr sz="2000" kern="1200">
+        <a:defRPr sz="3500" kern="1200">
           <a:solidFill>
             <a:schemeClr val="tx1"/>
           </a:solidFill>
@@ -2914,13 +2917,13 @@
           <a:cs typeface="+mn-cs"/>
         </a:defRPr>
       </a:lvl7pPr>
-      <a:lvl8pPr marL="3429000" indent="-228600" algn="l" defTabSz="914400" rtl="0" eaLnBrk="1" latinLnBrk="0" hangingPunct="1">
+      <a:lvl8pPr marL="6074131" indent="-404942" algn="l" defTabSz="1619768" rtl="0" eaLnBrk="1" latinLnBrk="0" hangingPunct="1">
         <a:spcBef>
           <a:spcPct val="20000"/>
         </a:spcBef>
         <a:buFont typeface="Arial" pitchFamily="34" charset="0"/>
         <a:buChar char="•"/>
-        <a:defRPr sz="2000" kern="1200">
+        <a:defRPr sz="3500" kern="1200">
           <a:solidFill>
             <a:schemeClr val="tx1"/>
           </a:solidFill>
@@ -2929,13 +2932,13 @@
           <a:cs typeface="+mn-cs"/>
         </a:defRPr>
       </a:lvl8pPr>
-      <a:lvl9pPr marL="3886200" indent="-228600" algn="l" defTabSz="914400" rtl="0" eaLnBrk="1" latinLnBrk="0" hangingPunct="1">
+      <a:lvl9pPr marL="6884015" indent="-404942" algn="l" defTabSz="1619768" rtl="0" eaLnBrk="1" latinLnBrk="0" hangingPunct="1">
         <a:spcBef>
           <a:spcPct val="20000"/>
         </a:spcBef>
         <a:buFont typeface="Arial" pitchFamily="34" charset="0"/>
         <a:buChar char="•"/>
-        <a:defRPr sz="2000" kern="1200">
+        <a:defRPr sz="3500" kern="1200">
           <a:solidFill>
             <a:schemeClr val="tx1"/>
           </a:solidFill>
@@ -2949,8 +2952,8 @@
       <a:defPPr>
         <a:defRPr lang="en-US"/>
       </a:defPPr>
-      <a:lvl1pPr marL="0" algn="l" defTabSz="914400" rtl="0" eaLnBrk="1" latinLnBrk="0" hangingPunct="1">
-        <a:defRPr sz="1800" kern="1200">
+      <a:lvl1pPr marL="0" algn="l" defTabSz="1619768" rtl="0" eaLnBrk="1" latinLnBrk="0" hangingPunct="1">
+        <a:defRPr sz="3200" kern="1200">
           <a:solidFill>
             <a:schemeClr val="tx1"/>
           </a:solidFill>
@@ -2959,8 +2962,8 @@
           <a:cs typeface="+mn-cs"/>
         </a:defRPr>
       </a:lvl1pPr>
-      <a:lvl2pPr marL="457200" algn="l" defTabSz="914400" rtl="0" eaLnBrk="1" latinLnBrk="0" hangingPunct="1">
-        <a:defRPr sz="1800" kern="1200">
+      <a:lvl2pPr marL="809884" algn="l" defTabSz="1619768" rtl="0" eaLnBrk="1" latinLnBrk="0" hangingPunct="1">
+        <a:defRPr sz="3200" kern="1200">
           <a:solidFill>
             <a:schemeClr val="tx1"/>
           </a:solidFill>
@@ -2969,8 +2972,8 @@
           <a:cs typeface="+mn-cs"/>
         </a:defRPr>
       </a:lvl2pPr>
-      <a:lvl3pPr marL="914400" algn="l" defTabSz="914400" rtl="0" eaLnBrk="1" latinLnBrk="0" hangingPunct="1">
-        <a:defRPr sz="1800" kern="1200">
+      <a:lvl3pPr marL="1619768" algn="l" defTabSz="1619768" rtl="0" eaLnBrk="1" latinLnBrk="0" hangingPunct="1">
+        <a:defRPr sz="3200" kern="1200">
           <a:solidFill>
             <a:schemeClr val="tx1"/>
           </a:solidFill>
@@ -2979,8 +2982,8 @@
           <a:cs typeface="+mn-cs"/>
         </a:defRPr>
       </a:lvl3pPr>
-      <a:lvl4pPr marL="1371600" algn="l" defTabSz="914400" rtl="0" eaLnBrk="1" latinLnBrk="0" hangingPunct="1">
-        <a:defRPr sz="1800" kern="1200">
+      <a:lvl4pPr marL="2429652" algn="l" defTabSz="1619768" rtl="0" eaLnBrk="1" latinLnBrk="0" hangingPunct="1">
+        <a:defRPr sz="3200" kern="1200">
           <a:solidFill>
             <a:schemeClr val="tx1"/>
           </a:solidFill>
@@ -2989,8 +2992,8 @@
           <a:cs typeface="+mn-cs"/>
         </a:defRPr>
       </a:lvl4pPr>
-      <a:lvl5pPr marL="1828800" algn="l" defTabSz="914400" rtl="0" eaLnBrk="1" latinLnBrk="0" hangingPunct="1">
-        <a:defRPr sz="1800" kern="1200">
+      <a:lvl5pPr marL="3239536" algn="l" defTabSz="1619768" rtl="0" eaLnBrk="1" latinLnBrk="0" hangingPunct="1">
+        <a:defRPr sz="3200" kern="1200">
           <a:solidFill>
             <a:schemeClr val="tx1"/>
           </a:solidFill>
@@ -2999,8 +3002,8 @@
           <a:cs typeface="+mn-cs"/>
         </a:defRPr>
       </a:lvl5pPr>
-      <a:lvl6pPr marL="2286000" algn="l" defTabSz="914400" rtl="0" eaLnBrk="1" latinLnBrk="0" hangingPunct="1">
-        <a:defRPr sz="1800" kern="1200">
+      <a:lvl6pPr marL="4049420" algn="l" defTabSz="1619768" rtl="0" eaLnBrk="1" latinLnBrk="0" hangingPunct="1">
+        <a:defRPr sz="3200" kern="1200">
           <a:solidFill>
             <a:schemeClr val="tx1"/>
           </a:solidFill>
@@ -3009,8 +3012,8 @@
           <a:cs typeface="+mn-cs"/>
         </a:defRPr>
       </a:lvl6pPr>
-      <a:lvl7pPr marL="2743200" algn="l" defTabSz="914400" rtl="0" eaLnBrk="1" latinLnBrk="0" hangingPunct="1">
-        <a:defRPr sz="1800" kern="1200">
+      <a:lvl7pPr marL="4859304" algn="l" defTabSz="1619768" rtl="0" eaLnBrk="1" latinLnBrk="0" hangingPunct="1">
+        <a:defRPr sz="3200" kern="1200">
           <a:solidFill>
             <a:schemeClr val="tx1"/>
           </a:solidFill>
@@ -3019,8 +3022,8 @@
           <a:cs typeface="+mn-cs"/>
         </a:defRPr>
       </a:lvl7pPr>
-      <a:lvl8pPr marL="3200400" algn="l" defTabSz="914400" rtl="0" eaLnBrk="1" latinLnBrk="0" hangingPunct="1">
-        <a:defRPr sz="1800" kern="1200">
+      <a:lvl8pPr marL="5669189" algn="l" defTabSz="1619768" rtl="0" eaLnBrk="1" latinLnBrk="0" hangingPunct="1">
+        <a:defRPr sz="3200" kern="1200">
           <a:solidFill>
             <a:schemeClr val="tx1"/>
           </a:solidFill>
@@ -3029,8 +3032,8 @@
           <a:cs typeface="+mn-cs"/>
         </a:defRPr>
       </a:lvl8pPr>
-      <a:lvl9pPr marL="3657600" algn="l" defTabSz="914400" rtl="0" eaLnBrk="1" latinLnBrk="0" hangingPunct="1">
-        <a:defRPr sz="1800" kern="1200">
+      <a:lvl9pPr marL="6479073" algn="l" defTabSz="1619768" rtl="0" eaLnBrk="1" latinLnBrk="0" hangingPunct="1">
+        <a:defRPr sz="3200" kern="1200">
           <a:solidFill>
             <a:schemeClr val="tx1"/>
           </a:solidFill>
@@ -3079,8 +3082,8 @@
         </p:nvSpPr>
         <p:spPr>
           <a:xfrm>
-            <a:off x="3195961" y="2052961"/>
-            <a:ext cx="2752078" cy="2752078"/>
+            <a:off x="6391922" y="3503818"/>
+            <a:ext cx="5504156" cy="4697008"/>
           </a:xfrm>
           <a:prstGeom prst="chevron">
             <a:avLst/>
@@ -3127,7 +3130,7 @@
           </a:fontRef>
         </p:style>
         <p:txBody>
-          <a:bodyPr rtlCol="0" anchor="ctr"/>
+          <a:bodyPr lIns="161977" tIns="80988" rIns="161977" bIns="80988" rtlCol="0" anchor="ctr"/>
           <a:lstStyle/>
           <a:p>
             <a:pPr algn="ctr"/>
@@ -3183,8 +3186,8 @@
         </p:nvSpPr>
         <p:spPr>
           <a:xfrm>
-            <a:off x="2878584" y="1735584"/>
-            <a:ext cx="3386832" cy="3386832"/>
+            <a:off x="5757168" y="2962144"/>
+            <a:ext cx="6773664" cy="5780352"/>
           </a:xfrm>
           <a:prstGeom prst="ellipse">
             <a:avLst/>
@@ -3233,7 +3236,7 @@
           </a:fontRef>
         </p:style>
         <p:txBody>
-          <a:bodyPr rtlCol="0" anchor="ctr"/>
+          <a:bodyPr lIns="161977" tIns="80988" rIns="161977" bIns="80988" rtlCol="0" anchor="ctr"/>
           <a:lstStyle/>
           <a:p>
             <a:pPr algn="ctr"/>
@@ -3255,6 +3258,187 @@
 </file>
 
 <file path=ppt/slides/slide3.xml><?xml version="1.0" encoding="utf-8"?>
+<p:sld xmlns:a="http://schemas.openxmlformats.org/drawingml/2006/main" xmlns:r="http://schemas.openxmlformats.org/officeDocument/2006/relationships" xmlns:p="http://schemas.openxmlformats.org/presentationml/2006/main">
+  <p:cSld>
+    <p:bg>
+      <p:bgPr>
+        <a:solidFill>
+          <a:schemeClr val="bg1">
+            <a:lumMod val="75000"/>
+          </a:schemeClr>
+        </a:solidFill>
+        <a:effectLst/>
+      </p:bgPr>
+    </p:bg>
+    <p:spTree>
+      <p:nvGrpSpPr>
+        <p:cNvPr id="1" name=""/>
+        <p:cNvGrpSpPr/>
+        <p:nvPr/>
+      </p:nvGrpSpPr>
+      <p:grpSpPr>
+        <a:xfrm>
+          <a:off x="0" y="0"/>
+          <a:ext cx="0" cy="0"/>
+          <a:chOff x="0" y="0"/>
+          <a:chExt cx="0" cy="0"/>
+        </a:xfrm>
+      </p:grpSpPr>
+      <p:sp>
+        <p:nvSpPr>
+          <p:cNvPr id="3" name="Rounded Rectangle 2"/>
+          <p:cNvSpPr/>
+          <p:nvPr/>
+        </p:nvSpPr>
+        <p:spPr>
+          <a:xfrm>
+            <a:off x="8214360" y="4938713"/>
+            <a:ext cx="1828800" cy="1828800"/>
+          </a:xfrm>
+          <a:prstGeom prst="roundRect">
+            <a:avLst>
+              <a:gd name="adj" fmla="val 7906"/>
+            </a:avLst>
+          </a:prstGeom>
+          <a:solidFill>
+            <a:schemeClr val="bg1"/>
+          </a:solidFill>
+          <a:ln>
+            <a:noFill/>
+          </a:ln>
+        </p:spPr>
+        <p:style>
+          <a:lnRef idx="2">
+            <a:schemeClr val="accent1">
+              <a:shade val="50000"/>
+            </a:schemeClr>
+          </a:lnRef>
+          <a:fillRef idx="1">
+            <a:schemeClr val="accent1"/>
+          </a:fillRef>
+          <a:effectRef idx="0">
+            <a:schemeClr val="accent1"/>
+          </a:effectRef>
+          <a:fontRef idx="minor">
+            <a:schemeClr val="lt1"/>
+          </a:fontRef>
+        </p:style>
+        <p:txBody>
+          <a:bodyPr rtlCol="0" anchor="ctr"/>
+          <a:lstStyle/>
+          <a:p>
+            <a:pPr algn="ctr"/>
+            <a:endParaRPr lang="en-US"/>
+          </a:p>
+        </p:txBody>
+      </p:sp>
+    </p:spTree>
+    <p:extLst>
+      <p:ext uri="{BB962C8B-B14F-4D97-AF65-F5344CB8AC3E}">
+        <p14:creationId xmlns:p14="http://schemas.microsoft.com/office/powerpoint/2010/main" val="161770870"/>
+      </p:ext>
+    </p:extLst>
+  </p:cSld>
+  <p:clrMapOvr>
+    <a:masterClrMapping/>
+  </p:clrMapOvr>
+</p:sld>
+</file>
+
+<file path=ppt/slides/slide4.xml><?xml version="1.0" encoding="utf-8"?>
+<p:sld xmlns:a="http://schemas.openxmlformats.org/drawingml/2006/main" xmlns:r="http://schemas.openxmlformats.org/officeDocument/2006/relationships" xmlns:p="http://schemas.openxmlformats.org/presentationml/2006/main">
+  <p:cSld>
+    <p:bg>
+      <p:bgPr>
+        <a:solidFill>
+          <a:schemeClr val="bg1">
+            <a:lumMod val="75000"/>
+          </a:schemeClr>
+        </a:solidFill>
+        <a:effectLst/>
+      </p:bgPr>
+    </p:bg>
+    <p:spTree>
+      <p:nvGrpSpPr>
+        <p:cNvPr id="1" name=""/>
+        <p:cNvGrpSpPr/>
+        <p:nvPr/>
+      </p:nvGrpSpPr>
+      <p:grpSpPr>
+        <a:xfrm>
+          <a:off x="0" y="0"/>
+          <a:ext cx="0" cy="0"/>
+          <a:chOff x="0" y="0"/>
+          <a:chExt cx="0" cy="0"/>
+        </a:xfrm>
+      </p:grpSpPr>
+      <p:sp>
+        <p:nvSpPr>
+          <p:cNvPr id="3" name="Heart 2"/>
+          <p:cNvSpPr/>
+          <p:nvPr/>
+        </p:nvSpPr>
+        <p:spPr>
+          <a:xfrm>
+            <a:off x="8214360" y="5119688"/>
+            <a:ext cx="1828800" cy="1509872"/>
+          </a:xfrm>
+          <a:prstGeom prst="heart">
+            <a:avLst/>
+          </a:prstGeom>
+          <a:solidFill>
+            <a:schemeClr val="accent6">
+              <a:lumMod val="60000"/>
+              <a:lumOff val="40000"/>
+            </a:schemeClr>
+          </a:solidFill>
+          <a:ln w="76200">
+            <a:solidFill>
+              <a:schemeClr val="accent6">
+                <a:lumMod val="75000"/>
+              </a:schemeClr>
+            </a:solidFill>
+          </a:ln>
+        </p:spPr>
+        <p:style>
+          <a:lnRef idx="2">
+            <a:schemeClr val="accent1">
+              <a:shade val="50000"/>
+            </a:schemeClr>
+          </a:lnRef>
+          <a:fillRef idx="1">
+            <a:schemeClr val="accent1"/>
+          </a:fillRef>
+          <a:effectRef idx="0">
+            <a:schemeClr val="accent1"/>
+          </a:effectRef>
+          <a:fontRef idx="minor">
+            <a:schemeClr val="lt1"/>
+          </a:fontRef>
+        </p:style>
+        <p:txBody>
+          <a:bodyPr rtlCol="0" anchor="ctr"/>
+          <a:lstStyle/>
+          <a:p>
+            <a:pPr algn="ctr"/>
+            <a:endParaRPr lang="en-US"/>
+          </a:p>
+        </p:txBody>
+      </p:sp>
+    </p:spTree>
+    <p:extLst>
+      <p:ext uri="{BB962C8B-B14F-4D97-AF65-F5344CB8AC3E}">
+        <p14:creationId xmlns:p14="http://schemas.microsoft.com/office/powerpoint/2010/main" val="2077745742"/>
+      </p:ext>
+    </p:extLst>
+  </p:cSld>
+  <p:clrMapOvr>
+    <a:masterClrMapping/>
+  </p:clrMapOvr>
+</p:sld>
+</file>
+
+<file path=ppt/slides/slide5.xml><?xml version="1.0" encoding="utf-8"?>
 <p:sld xmlns:a="http://schemas.openxmlformats.org/drawingml/2006/main" xmlns:r="http://schemas.openxmlformats.org/officeDocument/2006/relationships" xmlns:p="http://schemas.openxmlformats.org/presentationml/2006/main">
   <p:cSld>
     <p:spTree>
@@ -3279,8 +3463,8 @@
         </p:nvGrpSpPr>
         <p:grpSpPr>
           <a:xfrm>
-            <a:off x="1376039" y="233216"/>
-            <a:ext cx="6391922" cy="6391922"/>
+            <a:off x="2752078" y="398034"/>
+            <a:ext cx="12783844" cy="10909176"/>
             <a:chOff x="1959569" y="816746"/>
             <a:chExt cx="5224862" cy="5224862"/>
           </a:xfrm>
@@ -3464,6 +3648,1199 @@
     <p:extLst>
       <p:ext uri="{BB962C8B-B14F-4D97-AF65-F5344CB8AC3E}">
         <p14:creationId xmlns:p14="http://schemas.microsoft.com/office/powerpoint/2010/main" val="1569427304"/>
+      </p:ext>
+    </p:extLst>
+  </p:cSld>
+  <p:clrMapOvr>
+    <a:masterClrMapping/>
+  </p:clrMapOvr>
+</p:sld>
+</file>
+
+<file path=ppt/slides/slide6.xml><?xml version="1.0" encoding="utf-8"?>
+<p:sld xmlns:a="http://schemas.openxmlformats.org/drawingml/2006/main" xmlns:r="http://schemas.openxmlformats.org/officeDocument/2006/relationships" xmlns:p="http://schemas.openxmlformats.org/presentationml/2006/main">
+  <p:cSld>
+    <p:spTree>
+      <p:nvGrpSpPr>
+        <p:cNvPr id="1" name=""/>
+        <p:cNvGrpSpPr/>
+        <p:nvPr/>
+      </p:nvGrpSpPr>
+      <p:grpSpPr>
+        <a:xfrm>
+          <a:off x="0" y="0"/>
+          <a:ext cx="0" cy="0"/>
+          <a:chOff x="0" y="0"/>
+          <a:chExt cx="0" cy="0"/>
+        </a:xfrm>
+      </p:grpSpPr>
+      <p:sp>
+        <p:nvSpPr>
+          <p:cNvPr id="4" name="Rectangle 3"/>
+          <p:cNvSpPr/>
+          <p:nvPr/>
+        </p:nvSpPr>
+        <p:spPr>
+          <a:xfrm>
+            <a:off x="5848276" y="11589"/>
+            <a:ext cx="6591448" cy="11704638"/>
+          </a:xfrm>
+          <a:prstGeom prst="rect">
+            <a:avLst/>
+          </a:prstGeom>
+          <a:gradFill>
+            <a:gsLst>
+              <a:gs pos="0">
+                <a:srgbClr val="30F5D9"/>
+              </a:gs>
+              <a:gs pos="100000">
+                <a:srgbClr val="0745E8"/>
+              </a:gs>
+            </a:gsLst>
+            <a:lin ang="5400000" scaled="0"/>
+          </a:gradFill>
+          <a:ln>
+            <a:noFill/>
+          </a:ln>
+        </p:spPr>
+        <p:style>
+          <a:lnRef idx="2">
+            <a:schemeClr val="accent1">
+              <a:shade val="50000"/>
+            </a:schemeClr>
+          </a:lnRef>
+          <a:fillRef idx="1">
+            <a:schemeClr val="accent1"/>
+          </a:fillRef>
+          <a:effectRef idx="0">
+            <a:schemeClr val="accent1"/>
+          </a:effectRef>
+          <a:fontRef idx="minor">
+            <a:schemeClr val="lt1"/>
+          </a:fontRef>
+        </p:style>
+        <p:txBody>
+          <a:bodyPr lIns="161977" tIns="80988" rIns="161977" bIns="80988" spcCol="0" rtlCol="0" anchor="ctr"/>
+          <a:lstStyle/>
+          <a:p>
+            <a:pPr algn="ctr"/>
+            <a:endParaRPr lang="en-US"/>
+          </a:p>
+        </p:txBody>
+      </p:sp>
+      <p:sp>
+        <p:nvSpPr>
+          <p:cNvPr id="5" name="Oval 4"/>
+          <p:cNvSpPr/>
+          <p:nvPr/>
+        </p:nvSpPr>
+        <p:spPr>
+          <a:xfrm>
+            <a:off x="6362700" y="2270919"/>
+            <a:ext cx="5562600" cy="5562600"/>
+          </a:xfrm>
+          <a:prstGeom prst="ellipse">
+            <a:avLst/>
+          </a:prstGeom>
+          <a:noFill/>
+          <a:ln w="19050">
+            <a:solidFill>
+              <a:srgbClr val="FFFFFF">
+                <a:alpha val="74902"/>
+              </a:srgbClr>
+            </a:solidFill>
+            <a:prstDash val="sysDot"/>
+          </a:ln>
+        </p:spPr>
+        <p:style>
+          <a:lnRef idx="2">
+            <a:schemeClr val="accent1">
+              <a:shade val="50000"/>
+            </a:schemeClr>
+          </a:lnRef>
+          <a:fillRef idx="1">
+            <a:schemeClr val="accent1"/>
+          </a:fillRef>
+          <a:effectRef idx="0">
+            <a:schemeClr val="accent1"/>
+          </a:effectRef>
+          <a:fontRef idx="minor">
+            <a:schemeClr val="lt1"/>
+          </a:fontRef>
+        </p:style>
+        <p:txBody>
+          <a:bodyPr rtlCol="0" anchor="ctr"/>
+          <a:lstStyle/>
+          <a:p>
+            <a:pPr algn="ctr"/>
+            <a:endParaRPr lang="en-US"/>
+          </a:p>
+        </p:txBody>
+      </p:sp>
+      <p:pic>
+        <p:nvPicPr>
+          <p:cNvPr id="1027" name="Picture 3" descr="C:\Projects\VirtualFittingRoomMobileApp\Assets\Textures\Ui\Background.png"/>
+          <p:cNvPicPr>
+            <a:picLocks noChangeAspect="1" noChangeArrowheads="1"/>
+          </p:cNvPicPr>
+          <p:nvPr/>
+        </p:nvPicPr>
+        <p:blipFill>
+          <a:blip r:embed="rId2">
+            <a:extLst>
+              <a:ext uri="{28A0092B-C50C-407E-A947-70E740481C1C}">
+                <a14:useLocalDpi xmlns:a14="http://schemas.microsoft.com/office/drawing/2010/main" val="0"/>
+              </a:ext>
+            </a:extLst>
+          </a:blip>
+          <a:srcRect/>
+          <a:stretch>
+            <a:fillRect/>
+          </a:stretch>
+        </p:blipFill>
+        <p:spPr bwMode="auto">
+          <a:xfrm>
+            <a:off x="-1224280" y="-15874"/>
+            <a:ext cx="6591449" cy="11718131"/>
+          </a:xfrm>
+          <a:prstGeom prst="rect">
+            <a:avLst/>
+          </a:prstGeom>
+          <a:noFill/>
+          <a:ln>
+            <a:noFill/>
+          </a:ln>
+          <a:extLst>
+            <a:ext uri="{909E8E84-426E-40DD-AFC4-6F175D3DCCD1}">
+              <a14:hiddenFill xmlns:a14="http://schemas.microsoft.com/office/drawing/2010/main">
+                <a:solidFill>
+                  <a:srgbClr val="FFFFFF"/>
+                </a:solidFill>
+              </a14:hiddenFill>
+            </a:ext>
+          </a:extLst>
+        </p:spPr>
+      </p:pic>
+      <p:sp>
+        <p:nvSpPr>
+          <p:cNvPr id="6" name="Oval 5"/>
+          <p:cNvSpPr/>
+          <p:nvPr/>
+        </p:nvSpPr>
+        <p:spPr>
+          <a:xfrm>
+            <a:off x="7932420" y="3802698"/>
+            <a:ext cx="2423160" cy="2423160"/>
+          </a:xfrm>
+          <a:prstGeom prst="ellipse">
+            <a:avLst/>
+          </a:prstGeom>
+          <a:solidFill>
+            <a:srgbClr val="FFFF00"/>
+          </a:solidFill>
+          <a:ln>
+            <a:noFill/>
+          </a:ln>
+        </p:spPr>
+        <p:style>
+          <a:lnRef idx="2">
+            <a:schemeClr val="accent1">
+              <a:shade val="50000"/>
+            </a:schemeClr>
+          </a:lnRef>
+          <a:fillRef idx="1">
+            <a:schemeClr val="accent1"/>
+          </a:fillRef>
+          <a:effectRef idx="0">
+            <a:schemeClr val="accent1"/>
+          </a:effectRef>
+          <a:fontRef idx="minor">
+            <a:schemeClr val="lt1"/>
+          </a:fontRef>
+        </p:style>
+        <p:txBody>
+          <a:bodyPr rtlCol="0" anchor="ctr"/>
+          <a:lstStyle/>
+          <a:p>
+            <a:pPr algn="ctr"/>
+            <a:endParaRPr lang="en-US"/>
+          </a:p>
+        </p:txBody>
+      </p:sp>
+      <p:pic>
+        <p:nvPicPr>
+          <p:cNvPr id="1031" name="Picture 7"/>
+          <p:cNvPicPr>
+            <a:picLocks noChangeAspect="1" noChangeArrowheads="1"/>
+          </p:cNvPicPr>
+          <p:nvPr/>
+        </p:nvPicPr>
+        <p:blipFill>
+          <a:blip r:embed="rId3" cstate="print">
+            <a:extLst>
+              <a:ext uri="{28A0092B-C50C-407E-A947-70E740481C1C}">
+                <a14:useLocalDpi xmlns:a14="http://schemas.microsoft.com/office/drawing/2010/main" val="0"/>
+              </a:ext>
+            </a:extLst>
+          </a:blip>
+          <a:srcRect/>
+          <a:stretch>
+            <a:fillRect/>
+          </a:stretch>
+        </p:blipFill>
+        <p:spPr bwMode="auto">
+          <a:xfrm rot="20700000">
+            <a:off x="8412479" y="4282758"/>
+            <a:ext cx="1463042" cy="1463040"/>
+          </a:xfrm>
+          <a:prstGeom prst="rect">
+            <a:avLst/>
+          </a:prstGeom>
+          <a:noFill/>
+          <a:ln>
+            <a:noFill/>
+          </a:ln>
+          <a:effectLst/>
+          <a:extLst>
+            <a:ext uri="{909E8E84-426E-40DD-AFC4-6F175D3DCCD1}">
+              <a14:hiddenFill xmlns:a14="http://schemas.microsoft.com/office/drawing/2010/main">
+                <a:solidFill>
+                  <a:schemeClr val="accent1"/>
+                </a:solidFill>
+              </a14:hiddenFill>
+            </a:ext>
+            <a:ext uri="{91240B29-F687-4F45-9708-019B960494DF}">
+              <a14:hiddenLine xmlns:a14="http://schemas.microsoft.com/office/drawing/2010/main" w="9525">
+                <a:solidFill>
+                  <a:schemeClr val="tx1"/>
+                </a:solidFill>
+                <a:miter lim="800000"/>
+                <a:headEnd/>
+                <a:tailEnd/>
+              </a14:hiddenLine>
+            </a:ext>
+            <a:ext uri="{AF507438-7753-43E0-B8FC-AC1667EBCBE1}">
+              <a14:hiddenEffects xmlns:a14="http://schemas.microsoft.com/office/drawing/2010/main">
+                <a:effectLst>
+                  <a:outerShdw dist="35921" dir="2700000" algn="ctr" rotWithShape="0">
+                    <a:schemeClr val="bg2"/>
+                  </a:outerShdw>
+                </a:effectLst>
+              </a14:hiddenEffects>
+            </a:ext>
+          </a:extLst>
+        </p:spPr>
+      </p:pic>
+      <p:sp>
+        <p:nvSpPr>
+          <p:cNvPr id="7" name="4-Point Star 6"/>
+          <p:cNvSpPr/>
+          <p:nvPr/>
+        </p:nvSpPr>
+        <p:spPr>
+          <a:xfrm>
+            <a:off x="8233784" y="4237036"/>
+            <a:ext cx="485775" cy="485775"/>
+          </a:xfrm>
+          <a:prstGeom prst="star4">
+            <a:avLst/>
+          </a:prstGeom>
+          <a:solidFill>
+            <a:schemeClr val="bg1"/>
+          </a:solidFill>
+          <a:ln>
+            <a:noFill/>
+          </a:ln>
+        </p:spPr>
+        <p:style>
+          <a:lnRef idx="2">
+            <a:schemeClr val="accent1">
+              <a:shade val="50000"/>
+            </a:schemeClr>
+          </a:lnRef>
+          <a:fillRef idx="1">
+            <a:schemeClr val="accent1"/>
+          </a:fillRef>
+          <a:effectRef idx="0">
+            <a:schemeClr val="accent1"/>
+          </a:effectRef>
+          <a:fontRef idx="minor">
+            <a:schemeClr val="lt1"/>
+          </a:fontRef>
+        </p:style>
+        <p:txBody>
+          <a:bodyPr rtlCol="0" anchor="ctr"/>
+          <a:lstStyle/>
+          <a:p>
+            <a:pPr algn="ctr"/>
+            <a:endParaRPr lang="en-US"/>
+          </a:p>
+        </p:txBody>
+      </p:sp>
+      <p:sp>
+        <p:nvSpPr>
+          <p:cNvPr id="16" name="4-Point Star 15"/>
+          <p:cNvSpPr/>
+          <p:nvPr/>
+        </p:nvSpPr>
+        <p:spPr>
+          <a:xfrm>
+            <a:off x="9235440" y="5610225"/>
+            <a:ext cx="485775" cy="485775"/>
+          </a:xfrm>
+          <a:prstGeom prst="star4">
+            <a:avLst/>
+          </a:prstGeom>
+          <a:solidFill>
+            <a:schemeClr val="bg1"/>
+          </a:solidFill>
+          <a:ln>
+            <a:noFill/>
+          </a:ln>
+        </p:spPr>
+        <p:style>
+          <a:lnRef idx="2">
+            <a:schemeClr val="accent1">
+              <a:shade val="50000"/>
+            </a:schemeClr>
+          </a:lnRef>
+          <a:fillRef idx="1">
+            <a:schemeClr val="accent1"/>
+          </a:fillRef>
+          <a:effectRef idx="0">
+            <a:schemeClr val="accent1"/>
+          </a:effectRef>
+          <a:fontRef idx="minor">
+            <a:schemeClr val="lt1"/>
+          </a:fontRef>
+        </p:style>
+        <p:txBody>
+          <a:bodyPr rtlCol="0" anchor="ctr"/>
+          <a:lstStyle/>
+          <a:p>
+            <a:pPr algn="ctr"/>
+            <a:endParaRPr lang="en-US"/>
+          </a:p>
+        </p:txBody>
+      </p:sp>
+      <p:sp>
+        <p:nvSpPr>
+          <p:cNvPr id="17" name="4-Point Star 16"/>
+          <p:cNvSpPr/>
+          <p:nvPr/>
+        </p:nvSpPr>
+        <p:spPr>
+          <a:xfrm>
+            <a:off x="9832657" y="4528503"/>
+            <a:ext cx="485775" cy="485775"/>
+          </a:xfrm>
+          <a:prstGeom prst="star4">
+            <a:avLst/>
+          </a:prstGeom>
+          <a:solidFill>
+            <a:schemeClr val="bg1"/>
+          </a:solidFill>
+          <a:ln>
+            <a:noFill/>
+          </a:ln>
+        </p:spPr>
+        <p:style>
+          <a:lnRef idx="2">
+            <a:schemeClr val="accent1">
+              <a:shade val="50000"/>
+            </a:schemeClr>
+          </a:lnRef>
+          <a:fillRef idx="1">
+            <a:schemeClr val="accent1"/>
+          </a:fillRef>
+          <a:effectRef idx="0">
+            <a:schemeClr val="accent1"/>
+          </a:effectRef>
+          <a:fontRef idx="minor">
+            <a:schemeClr val="lt1"/>
+          </a:fontRef>
+        </p:style>
+        <p:txBody>
+          <a:bodyPr rtlCol="0" anchor="ctr"/>
+          <a:lstStyle/>
+          <a:p>
+            <a:pPr algn="ctr"/>
+            <a:endParaRPr lang="en-US"/>
+          </a:p>
+        </p:txBody>
+      </p:sp>
+      <p:sp>
+        <p:nvSpPr>
+          <p:cNvPr id="19" name="Oval 18"/>
+          <p:cNvSpPr/>
+          <p:nvPr/>
+        </p:nvSpPr>
+        <p:spPr>
+          <a:xfrm>
+            <a:off x="6863556" y="2771775"/>
+            <a:ext cx="4560888" cy="4560888"/>
+          </a:xfrm>
+          <a:prstGeom prst="ellipse">
+            <a:avLst/>
+          </a:prstGeom>
+          <a:noFill/>
+          <a:ln w="19050">
+            <a:solidFill>
+              <a:srgbClr val="FFFFFF">
+                <a:alpha val="74902"/>
+              </a:srgbClr>
+            </a:solidFill>
+            <a:prstDash val="sysDot"/>
+          </a:ln>
+        </p:spPr>
+        <p:style>
+          <a:lnRef idx="2">
+            <a:schemeClr val="accent1">
+              <a:shade val="50000"/>
+            </a:schemeClr>
+          </a:lnRef>
+          <a:fillRef idx="1">
+            <a:schemeClr val="accent1"/>
+          </a:fillRef>
+          <a:effectRef idx="0">
+            <a:schemeClr val="accent1"/>
+          </a:effectRef>
+          <a:fontRef idx="minor">
+            <a:schemeClr val="lt1"/>
+          </a:fontRef>
+        </p:style>
+        <p:txBody>
+          <a:bodyPr rtlCol="0" anchor="ctr"/>
+          <a:lstStyle/>
+          <a:p>
+            <a:pPr algn="ctr"/>
+            <a:endParaRPr lang="en-US"/>
+          </a:p>
+        </p:txBody>
+      </p:sp>
+      <p:sp>
+        <p:nvSpPr>
+          <p:cNvPr id="20" name="Oval 19"/>
+          <p:cNvSpPr/>
+          <p:nvPr/>
+        </p:nvSpPr>
+        <p:spPr>
+          <a:xfrm>
+            <a:off x="7433151" y="3352800"/>
+            <a:ext cx="3398838" cy="3398838"/>
+          </a:xfrm>
+          <a:prstGeom prst="ellipse">
+            <a:avLst/>
+          </a:prstGeom>
+          <a:noFill/>
+          <a:ln w="19050">
+            <a:solidFill>
+              <a:srgbClr val="FFFFFF">
+                <a:alpha val="74902"/>
+              </a:srgbClr>
+            </a:solidFill>
+            <a:prstDash val="sysDot"/>
+          </a:ln>
+        </p:spPr>
+        <p:style>
+          <a:lnRef idx="2">
+            <a:schemeClr val="accent1">
+              <a:shade val="50000"/>
+            </a:schemeClr>
+          </a:lnRef>
+          <a:fillRef idx="1">
+            <a:schemeClr val="accent1"/>
+          </a:fillRef>
+          <a:effectRef idx="0">
+            <a:schemeClr val="accent1"/>
+          </a:effectRef>
+          <a:fontRef idx="minor">
+            <a:schemeClr val="lt1"/>
+          </a:fontRef>
+        </p:style>
+        <p:txBody>
+          <a:bodyPr rtlCol="0" anchor="ctr"/>
+          <a:lstStyle/>
+          <a:p>
+            <a:pPr algn="ctr"/>
+            <a:endParaRPr lang="en-US"/>
+          </a:p>
+        </p:txBody>
+      </p:sp>
+      <p:pic>
+        <p:nvPicPr>
+          <p:cNvPr id="1026" name="Picture 2"/>
+          <p:cNvPicPr>
+            <a:picLocks noChangeAspect="1" noChangeArrowheads="1"/>
+          </p:cNvPicPr>
+          <p:nvPr/>
+        </p:nvPicPr>
+        <p:blipFill>
+          <a:blip r:embed="rId4" cstate="print">
+            <a:extLst>
+              <a:ext uri="{28A0092B-C50C-407E-A947-70E740481C1C}">
+                <a14:useLocalDpi xmlns:a14="http://schemas.microsoft.com/office/drawing/2010/main" val="0"/>
+              </a:ext>
+            </a:extLst>
+          </a:blip>
+          <a:srcRect/>
+          <a:stretch>
+            <a:fillRect/>
+          </a:stretch>
+        </p:blipFill>
+        <p:spPr bwMode="auto">
+          <a:xfrm>
+            <a:off x="6959914" y="3235486"/>
+            <a:ext cx="677225" cy="677225"/>
+          </a:xfrm>
+          <a:prstGeom prst="rect">
+            <a:avLst/>
+          </a:prstGeom>
+          <a:noFill/>
+          <a:ln>
+            <a:noFill/>
+          </a:ln>
+          <a:effectLst/>
+          <a:extLst>
+            <a:ext uri="{909E8E84-426E-40DD-AFC4-6F175D3DCCD1}">
+              <a14:hiddenFill xmlns:a14="http://schemas.microsoft.com/office/drawing/2010/main">
+                <a:solidFill>
+                  <a:schemeClr val="accent1"/>
+                </a:solidFill>
+              </a14:hiddenFill>
+            </a:ext>
+            <a:ext uri="{91240B29-F687-4F45-9708-019B960494DF}">
+              <a14:hiddenLine xmlns:a14="http://schemas.microsoft.com/office/drawing/2010/main" w="9525">
+                <a:solidFill>
+                  <a:schemeClr val="tx1"/>
+                </a:solidFill>
+                <a:miter lim="800000"/>
+                <a:headEnd/>
+                <a:tailEnd/>
+              </a14:hiddenLine>
+            </a:ext>
+            <a:ext uri="{AF507438-7753-43E0-B8FC-AC1667EBCBE1}">
+              <a14:hiddenEffects xmlns:a14="http://schemas.microsoft.com/office/drawing/2010/main">
+                <a:effectLst>
+                  <a:outerShdw dist="35921" dir="2700000" algn="ctr" rotWithShape="0">
+                    <a:schemeClr val="bg2"/>
+                  </a:outerShdw>
+                </a:effectLst>
+              </a14:hiddenEffects>
+            </a:ext>
+          </a:extLst>
+        </p:spPr>
+      </p:pic>
+      <p:pic>
+        <p:nvPicPr>
+          <p:cNvPr id="2" name="Picture 3"/>
+          <p:cNvPicPr>
+            <a:picLocks noChangeAspect="1" noChangeArrowheads="1"/>
+          </p:cNvPicPr>
+          <p:nvPr/>
+        </p:nvPicPr>
+        <p:blipFill>
+          <a:blip r:embed="rId5" cstate="print">
+            <a:extLst>
+              <a:ext uri="{28A0092B-C50C-407E-A947-70E740481C1C}">
+                <a14:useLocalDpi xmlns:a14="http://schemas.microsoft.com/office/drawing/2010/main" val="0"/>
+              </a:ext>
+            </a:extLst>
+          </a:blip>
+          <a:srcRect/>
+          <a:stretch>
+            <a:fillRect/>
+          </a:stretch>
+        </p:blipFill>
+        <p:spPr bwMode="auto">
+          <a:xfrm>
+            <a:off x="7315671" y="6404174"/>
+            <a:ext cx="691435" cy="691435"/>
+          </a:xfrm>
+          <a:prstGeom prst="rect">
+            <a:avLst/>
+          </a:prstGeom>
+          <a:noFill/>
+          <a:ln>
+            <a:noFill/>
+          </a:ln>
+          <a:effectLst/>
+          <a:extLst>
+            <a:ext uri="{909E8E84-426E-40DD-AFC4-6F175D3DCCD1}">
+              <a14:hiddenFill xmlns:a14="http://schemas.microsoft.com/office/drawing/2010/main">
+                <a:solidFill>
+                  <a:schemeClr val="accent1"/>
+                </a:solidFill>
+              </a14:hiddenFill>
+            </a:ext>
+            <a:ext uri="{91240B29-F687-4F45-9708-019B960494DF}">
+              <a14:hiddenLine xmlns:a14="http://schemas.microsoft.com/office/drawing/2010/main" w="9525">
+                <a:solidFill>
+                  <a:schemeClr val="tx1"/>
+                </a:solidFill>
+                <a:miter lim="800000"/>
+                <a:headEnd/>
+                <a:tailEnd/>
+              </a14:hiddenLine>
+            </a:ext>
+            <a:ext uri="{AF507438-7753-43E0-B8FC-AC1667EBCBE1}">
+              <a14:hiddenEffects xmlns:a14="http://schemas.microsoft.com/office/drawing/2010/main">
+                <a:effectLst>
+                  <a:outerShdw dist="35921" dir="2700000" algn="ctr" rotWithShape="0">
+                    <a:schemeClr val="bg2"/>
+                  </a:outerShdw>
+                </a:effectLst>
+              </a14:hiddenEffects>
+            </a:ext>
+          </a:extLst>
+        </p:spPr>
+      </p:pic>
+      <p:pic>
+        <p:nvPicPr>
+          <p:cNvPr id="1028" name="Picture 4"/>
+          <p:cNvPicPr>
+            <a:picLocks noChangeAspect="1" noChangeArrowheads="1"/>
+          </p:cNvPicPr>
+          <p:nvPr/>
+        </p:nvPicPr>
+        <p:blipFill>
+          <a:blip r:embed="rId6" cstate="print">
+            <a:extLst>
+              <a:ext uri="{28A0092B-C50C-407E-A947-70E740481C1C}">
+                <a14:useLocalDpi xmlns:a14="http://schemas.microsoft.com/office/drawing/2010/main" val="0"/>
+              </a:ext>
+            </a:extLst>
+          </a:blip>
+          <a:srcRect/>
+          <a:stretch>
+            <a:fillRect/>
+          </a:stretch>
+        </p:blipFill>
+        <p:spPr bwMode="auto">
+          <a:xfrm>
+            <a:off x="10903109" y="6042583"/>
+            <a:ext cx="691434" cy="691434"/>
+          </a:xfrm>
+          <a:prstGeom prst="rect">
+            <a:avLst/>
+          </a:prstGeom>
+          <a:noFill/>
+          <a:ln>
+            <a:noFill/>
+          </a:ln>
+          <a:effectLst/>
+          <a:extLst>
+            <a:ext uri="{909E8E84-426E-40DD-AFC4-6F175D3DCCD1}">
+              <a14:hiddenFill xmlns:a14="http://schemas.microsoft.com/office/drawing/2010/main">
+                <a:solidFill>
+                  <a:schemeClr val="accent1"/>
+                </a:solidFill>
+              </a14:hiddenFill>
+            </a:ext>
+            <a:ext uri="{91240B29-F687-4F45-9708-019B960494DF}">
+              <a14:hiddenLine xmlns:a14="http://schemas.microsoft.com/office/drawing/2010/main" w="9525">
+                <a:solidFill>
+                  <a:schemeClr val="tx1"/>
+                </a:solidFill>
+                <a:miter lim="800000"/>
+                <a:headEnd/>
+                <a:tailEnd/>
+              </a14:hiddenLine>
+            </a:ext>
+            <a:ext uri="{AF507438-7753-43E0-B8FC-AC1667EBCBE1}">
+              <a14:hiddenEffects xmlns:a14="http://schemas.microsoft.com/office/drawing/2010/main">
+                <a:effectLst>
+                  <a:outerShdw dist="35921" dir="2700000" algn="ctr" rotWithShape="0">
+                    <a:schemeClr val="bg2"/>
+                  </a:outerShdw>
+                </a:effectLst>
+              </a14:hiddenEffects>
+            </a:ext>
+          </a:extLst>
+        </p:spPr>
+      </p:pic>
+      <p:pic>
+        <p:nvPicPr>
+          <p:cNvPr id="1029" name="Picture 5"/>
+          <p:cNvPicPr>
+            <a:picLocks noChangeAspect="1" noChangeArrowheads="1"/>
+          </p:cNvPicPr>
+          <p:nvPr/>
+        </p:nvPicPr>
+        <p:blipFill>
+          <a:blip r:embed="rId7" cstate="print">
+            <a:extLst>
+              <a:ext uri="{28A0092B-C50C-407E-A947-70E740481C1C}">
+                <a14:useLocalDpi xmlns:a14="http://schemas.microsoft.com/office/drawing/2010/main" val="0"/>
+              </a:ext>
+            </a:extLst>
+          </a:blip>
+          <a:srcRect/>
+          <a:stretch>
+            <a:fillRect/>
+          </a:stretch>
+        </p:blipFill>
+        <p:spPr bwMode="auto">
+          <a:xfrm>
+            <a:off x="9977298" y="3120431"/>
+            <a:ext cx="682267" cy="682267"/>
+          </a:xfrm>
+          <a:prstGeom prst="rect">
+            <a:avLst/>
+          </a:prstGeom>
+          <a:noFill/>
+          <a:ln>
+            <a:noFill/>
+          </a:ln>
+          <a:effectLst/>
+          <a:extLst>
+            <a:ext uri="{909E8E84-426E-40DD-AFC4-6F175D3DCCD1}">
+              <a14:hiddenFill xmlns:a14="http://schemas.microsoft.com/office/drawing/2010/main">
+                <a:solidFill>
+                  <a:schemeClr val="accent1"/>
+                </a:solidFill>
+              </a14:hiddenFill>
+            </a:ext>
+            <a:ext uri="{91240B29-F687-4F45-9708-019B960494DF}">
+              <a14:hiddenLine xmlns:a14="http://schemas.microsoft.com/office/drawing/2010/main" w="9525">
+                <a:solidFill>
+                  <a:schemeClr val="tx1"/>
+                </a:solidFill>
+                <a:miter lim="800000"/>
+                <a:headEnd/>
+                <a:tailEnd/>
+              </a14:hiddenLine>
+            </a:ext>
+            <a:ext uri="{AF507438-7753-43E0-B8FC-AC1667EBCBE1}">
+              <a14:hiddenEffects xmlns:a14="http://schemas.microsoft.com/office/drawing/2010/main">
+                <a:effectLst>
+                  <a:outerShdw dist="35921" dir="2700000" algn="ctr" rotWithShape="0">
+                    <a:schemeClr val="bg2"/>
+                  </a:outerShdw>
+                </a:effectLst>
+              </a14:hiddenEffects>
+            </a:ext>
+          </a:extLst>
+        </p:spPr>
+      </p:pic>
+      <p:sp>
+        <p:nvSpPr>
+          <p:cNvPr id="3" name="Oval 2"/>
+          <p:cNvSpPr/>
+          <p:nvPr/>
+        </p:nvSpPr>
+        <p:spPr>
+          <a:xfrm>
+            <a:off x="7772400" y="2560479"/>
+            <a:ext cx="96358" cy="96358"/>
+          </a:xfrm>
+          <a:prstGeom prst="ellipse">
+            <a:avLst/>
+          </a:prstGeom>
+          <a:solidFill>
+            <a:schemeClr val="bg1"/>
+          </a:solidFill>
+          <a:ln>
+            <a:noFill/>
+          </a:ln>
+        </p:spPr>
+        <p:style>
+          <a:lnRef idx="2">
+            <a:schemeClr val="accent1">
+              <a:shade val="50000"/>
+            </a:schemeClr>
+          </a:lnRef>
+          <a:fillRef idx="1">
+            <a:schemeClr val="accent1"/>
+          </a:fillRef>
+          <a:effectRef idx="0">
+            <a:schemeClr val="accent1"/>
+          </a:effectRef>
+          <a:fontRef idx="minor">
+            <a:schemeClr val="lt1"/>
+          </a:fontRef>
+        </p:style>
+        <p:txBody>
+          <a:bodyPr rtlCol="0" anchor="ctr"/>
+          <a:lstStyle/>
+          <a:p>
+            <a:pPr algn="ctr"/>
+            <a:endParaRPr lang="en-US"/>
+          </a:p>
+        </p:txBody>
+      </p:sp>
+      <p:sp>
+        <p:nvSpPr>
+          <p:cNvPr id="21" name="Oval 20"/>
+          <p:cNvSpPr/>
+          <p:nvPr/>
+        </p:nvSpPr>
+        <p:spPr>
+          <a:xfrm>
+            <a:off x="6350162" y="4664315"/>
+            <a:ext cx="96358" cy="96358"/>
+          </a:xfrm>
+          <a:prstGeom prst="ellipse">
+            <a:avLst/>
+          </a:prstGeom>
+          <a:solidFill>
+            <a:schemeClr val="bg1"/>
+          </a:solidFill>
+          <a:ln>
+            <a:noFill/>
+          </a:ln>
+        </p:spPr>
+        <p:style>
+          <a:lnRef idx="2">
+            <a:schemeClr val="accent1">
+              <a:shade val="50000"/>
+            </a:schemeClr>
+          </a:lnRef>
+          <a:fillRef idx="1">
+            <a:schemeClr val="accent1"/>
+          </a:fillRef>
+          <a:effectRef idx="0">
+            <a:schemeClr val="accent1"/>
+          </a:effectRef>
+          <a:fontRef idx="minor">
+            <a:schemeClr val="lt1"/>
+          </a:fontRef>
+        </p:style>
+        <p:txBody>
+          <a:bodyPr rtlCol="0" anchor="ctr"/>
+          <a:lstStyle/>
+          <a:p>
+            <a:pPr algn="ctr"/>
+            <a:endParaRPr lang="en-US"/>
+          </a:p>
+        </p:txBody>
+      </p:sp>
+      <p:sp>
+        <p:nvSpPr>
+          <p:cNvPr id="22" name="Oval 21"/>
+          <p:cNvSpPr/>
+          <p:nvPr/>
+        </p:nvSpPr>
+        <p:spPr>
+          <a:xfrm>
+            <a:off x="7955280" y="3695226"/>
+            <a:ext cx="96358" cy="96358"/>
+          </a:xfrm>
+          <a:prstGeom prst="ellipse">
+            <a:avLst/>
+          </a:prstGeom>
+          <a:solidFill>
+            <a:schemeClr val="bg1"/>
+          </a:solidFill>
+          <a:ln>
+            <a:noFill/>
+          </a:ln>
+        </p:spPr>
+        <p:style>
+          <a:lnRef idx="2">
+            <a:schemeClr val="accent1">
+              <a:shade val="50000"/>
+            </a:schemeClr>
+          </a:lnRef>
+          <a:fillRef idx="1">
+            <a:schemeClr val="accent1"/>
+          </a:fillRef>
+          <a:effectRef idx="0">
+            <a:schemeClr val="accent1"/>
+          </a:effectRef>
+          <a:fontRef idx="minor">
+            <a:schemeClr val="lt1"/>
+          </a:fontRef>
+        </p:style>
+        <p:txBody>
+          <a:bodyPr rtlCol="0" anchor="ctr"/>
+          <a:lstStyle/>
+          <a:p>
+            <a:pPr algn="ctr"/>
+            <a:endParaRPr lang="en-US"/>
+          </a:p>
+        </p:txBody>
+      </p:sp>
+      <p:sp>
+        <p:nvSpPr>
+          <p:cNvPr id="23" name="Oval 22"/>
+          <p:cNvSpPr/>
+          <p:nvPr/>
+        </p:nvSpPr>
+        <p:spPr>
+          <a:xfrm>
+            <a:off x="8538210" y="6602891"/>
+            <a:ext cx="137160" cy="137160"/>
+          </a:xfrm>
+          <a:prstGeom prst="ellipse">
+            <a:avLst/>
+          </a:prstGeom>
+          <a:solidFill>
+            <a:schemeClr val="bg1"/>
+          </a:solidFill>
+          <a:ln>
+            <a:noFill/>
+          </a:ln>
+        </p:spPr>
+        <p:style>
+          <a:lnRef idx="2">
+            <a:schemeClr val="accent1">
+              <a:shade val="50000"/>
+            </a:schemeClr>
+          </a:lnRef>
+          <a:fillRef idx="1">
+            <a:schemeClr val="accent1"/>
+          </a:fillRef>
+          <a:effectRef idx="0">
+            <a:schemeClr val="accent1"/>
+          </a:effectRef>
+          <a:fontRef idx="minor">
+            <a:schemeClr val="lt1"/>
+          </a:fontRef>
+        </p:style>
+        <p:txBody>
+          <a:bodyPr rtlCol="0" anchor="ctr"/>
+          <a:lstStyle/>
+          <a:p>
+            <a:pPr algn="ctr"/>
+            <a:endParaRPr lang="en-US"/>
+          </a:p>
+        </p:txBody>
+      </p:sp>
+      <p:sp>
+        <p:nvSpPr>
+          <p:cNvPr id="24" name="Oval 23"/>
+          <p:cNvSpPr/>
+          <p:nvPr/>
+        </p:nvSpPr>
+        <p:spPr>
+          <a:xfrm>
+            <a:off x="6941816" y="5774611"/>
+            <a:ext cx="89297" cy="89297"/>
+          </a:xfrm>
+          <a:prstGeom prst="ellipse">
+            <a:avLst/>
+          </a:prstGeom>
+          <a:solidFill>
+            <a:schemeClr val="bg1"/>
+          </a:solidFill>
+          <a:ln>
+            <a:noFill/>
+          </a:ln>
+        </p:spPr>
+        <p:style>
+          <a:lnRef idx="2">
+            <a:schemeClr val="accent1">
+              <a:shade val="50000"/>
+            </a:schemeClr>
+          </a:lnRef>
+          <a:fillRef idx="1">
+            <a:schemeClr val="accent1"/>
+          </a:fillRef>
+          <a:effectRef idx="0">
+            <a:schemeClr val="accent1"/>
+          </a:effectRef>
+          <a:fontRef idx="minor">
+            <a:schemeClr val="lt1"/>
+          </a:fontRef>
+        </p:style>
+        <p:txBody>
+          <a:bodyPr rtlCol="0" anchor="ctr"/>
+          <a:lstStyle/>
+          <a:p>
+            <a:pPr algn="ctr"/>
+            <a:endParaRPr lang="en-US"/>
+          </a:p>
+        </p:txBody>
+      </p:sp>
+      <p:sp>
+        <p:nvSpPr>
+          <p:cNvPr id="25" name="Oval 24"/>
+          <p:cNvSpPr/>
+          <p:nvPr/>
+        </p:nvSpPr>
+        <p:spPr>
+          <a:xfrm>
+            <a:off x="11299746" y="5610225"/>
+            <a:ext cx="89297" cy="89297"/>
+          </a:xfrm>
+          <a:prstGeom prst="ellipse">
+            <a:avLst/>
+          </a:prstGeom>
+          <a:solidFill>
+            <a:schemeClr val="bg1"/>
+          </a:solidFill>
+          <a:ln>
+            <a:noFill/>
+          </a:ln>
+        </p:spPr>
+        <p:style>
+          <a:lnRef idx="2">
+            <a:schemeClr val="accent1">
+              <a:shade val="50000"/>
+            </a:schemeClr>
+          </a:lnRef>
+          <a:fillRef idx="1">
+            <a:schemeClr val="accent1"/>
+          </a:fillRef>
+          <a:effectRef idx="0">
+            <a:schemeClr val="accent1"/>
+          </a:effectRef>
+          <a:fontRef idx="minor">
+            <a:schemeClr val="lt1"/>
+          </a:fontRef>
+        </p:style>
+        <p:txBody>
+          <a:bodyPr rtlCol="0" anchor="ctr"/>
+          <a:lstStyle/>
+          <a:p>
+            <a:pPr algn="ctr"/>
+            <a:endParaRPr lang="en-US"/>
+          </a:p>
+        </p:txBody>
+      </p:sp>
+      <p:sp>
+        <p:nvSpPr>
+          <p:cNvPr id="26" name="Oval 25"/>
+          <p:cNvSpPr/>
+          <p:nvPr/>
+        </p:nvSpPr>
+        <p:spPr>
+          <a:xfrm>
+            <a:off x="10075544" y="7610874"/>
+            <a:ext cx="89297" cy="89297"/>
+          </a:xfrm>
+          <a:prstGeom prst="ellipse">
+            <a:avLst/>
+          </a:prstGeom>
+          <a:solidFill>
+            <a:schemeClr val="bg1"/>
+          </a:solidFill>
+          <a:ln>
+            <a:noFill/>
+          </a:ln>
+        </p:spPr>
+        <p:style>
+          <a:lnRef idx="2">
+            <a:schemeClr val="accent1">
+              <a:shade val="50000"/>
+            </a:schemeClr>
+          </a:lnRef>
+          <a:fillRef idx="1">
+            <a:schemeClr val="accent1"/>
+          </a:fillRef>
+          <a:effectRef idx="0">
+            <a:schemeClr val="accent1"/>
+          </a:effectRef>
+          <a:fontRef idx="minor">
+            <a:schemeClr val="lt1"/>
+          </a:fontRef>
+        </p:style>
+        <p:txBody>
+          <a:bodyPr rtlCol="0" anchor="ctr"/>
+          <a:lstStyle/>
+          <a:p>
+            <a:pPr algn="ctr"/>
+            <a:endParaRPr lang="en-US"/>
+          </a:p>
+        </p:txBody>
+      </p:sp>
+      <p:sp>
+        <p:nvSpPr>
+          <p:cNvPr id="27" name="Oval 26"/>
+          <p:cNvSpPr/>
+          <p:nvPr/>
+        </p:nvSpPr>
+        <p:spPr>
+          <a:xfrm>
+            <a:off x="7910631" y="7521577"/>
+            <a:ext cx="89297" cy="89297"/>
+          </a:xfrm>
+          <a:prstGeom prst="ellipse">
+            <a:avLst/>
+          </a:prstGeom>
+          <a:solidFill>
+            <a:schemeClr val="bg1"/>
+          </a:solidFill>
+          <a:ln>
+            <a:noFill/>
+          </a:ln>
+        </p:spPr>
+        <p:style>
+          <a:lnRef idx="2">
+            <a:schemeClr val="accent1">
+              <a:shade val="50000"/>
+            </a:schemeClr>
+          </a:lnRef>
+          <a:fillRef idx="1">
+            <a:schemeClr val="accent1"/>
+          </a:fillRef>
+          <a:effectRef idx="0">
+            <a:schemeClr val="accent1"/>
+          </a:effectRef>
+          <a:fontRef idx="minor">
+            <a:schemeClr val="lt1"/>
+          </a:fontRef>
+        </p:style>
+        <p:txBody>
+          <a:bodyPr rtlCol="0" anchor="ctr"/>
+          <a:lstStyle/>
+          <a:p>
+            <a:pPr algn="ctr"/>
+            <a:endParaRPr lang="en-US"/>
+          </a:p>
+        </p:txBody>
+      </p:sp>
+      <p:sp>
+        <p:nvSpPr>
+          <p:cNvPr id="28" name="Oval 27"/>
+          <p:cNvSpPr/>
+          <p:nvPr/>
+        </p:nvSpPr>
+        <p:spPr>
+          <a:xfrm>
+            <a:off x="10509070" y="6751638"/>
+            <a:ext cx="137160" cy="137160"/>
+          </a:xfrm>
+          <a:prstGeom prst="ellipse">
+            <a:avLst/>
+          </a:prstGeom>
+          <a:solidFill>
+            <a:schemeClr val="bg1"/>
+          </a:solidFill>
+          <a:ln>
+            <a:noFill/>
+          </a:ln>
+        </p:spPr>
+        <p:style>
+          <a:lnRef idx="2">
+            <a:schemeClr val="accent1">
+              <a:shade val="50000"/>
+            </a:schemeClr>
+          </a:lnRef>
+          <a:fillRef idx="1">
+            <a:schemeClr val="accent1"/>
+          </a:fillRef>
+          <a:effectRef idx="0">
+            <a:schemeClr val="accent1"/>
+          </a:effectRef>
+          <a:fontRef idx="minor">
+            <a:schemeClr val="lt1"/>
+          </a:fontRef>
+        </p:style>
+        <p:txBody>
+          <a:bodyPr rtlCol="0" anchor="ctr"/>
+          <a:lstStyle/>
+          <a:p>
+            <a:pPr algn="ctr"/>
+            <a:endParaRPr lang="en-US"/>
+          </a:p>
+        </p:txBody>
+      </p:sp>
+    </p:spTree>
+    <p:extLst>
+      <p:ext uri="{BB962C8B-B14F-4D97-AF65-F5344CB8AC3E}">
+        <p14:creationId xmlns:p14="http://schemas.microsoft.com/office/powerpoint/2010/main" val="3451462568"/>
       </p:ext>
     </p:extLst>
   </p:cSld>

</xml_diff>

<commit_message>
Logo changed to "cloudiyan" and added its font.
</commit_message>
<xml_diff>
--- a/Assets/Textures/Icons.pptx
+++ b/Assets/Textures/Icons.pptx
@@ -9,8 +9,9 @@
     <p:sldId id="257" r:id="rId3"/>
     <p:sldId id="260" r:id="rId4"/>
     <p:sldId id="261" r:id="rId5"/>
-    <p:sldId id="258" r:id="rId6"/>
-    <p:sldId id="259" r:id="rId7"/>
+    <p:sldId id="262" r:id="rId6"/>
+    <p:sldId id="258" r:id="rId7"/>
+    <p:sldId id="259" r:id="rId8"/>
   </p:sldIdLst>
   <p:sldSz cx="18288000" cy="11704638"/>
   <p:notesSz cx="6858000" cy="9144000"/>
@@ -294,7 +295,7 @@
             <a:fld id="{1D8BD707-D9CF-40AE-B4C6-C98DA3205C09}" type="datetimeFigureOut">
               <a:rPr lang="en-US" smtClean="0"/>
               <a:pPr/>
-              <a:t>24-Jan-19</a:t>
+              <a:t>25-Jan-19</a:t>
             </a:fld>
             <a:endParaRPr lang="en-US"/>
           </a:p>
@@ -461,7 +462,7 @@
             <a:fld id="{1D8BD707-D9CF-40AE-B4C6-C98DA3205C09}" type="datetimeFigureOut">
               <a:rPr lang="en-US" smtClean="0"/>
               <a:pPr/>
-              <a:t>24-Jan-19</a:t>
+              <a:t>25-Jan-19</a:t>
             </a:fld>
             <a:endParaRPr lang="en-US"/>
           </a:p>
@@ -638,7 +639,7 @@
             <a:fld id="{1D8BD707-D9CF-40AE-B4C6-C98DA3205C09}" type="datetimeFigureOut">
               <a:rPr lang="en-US" smtClean="0"/>
               <a:pPr/>
-              <a:t>24-Jan-19</a:t>
+              <a:t>25-Jan-19</a:t>
             </a:fld>
             <a:endParaRPr lang="en-US"/>
           </a:p>
@@ -805,7 +806,7 @@
             <a:fld id="{1D8BD707-D9CF-40AE-B4C6-C98DA3205C09}" type="datetimeFigureOut">
               <a:rPr lang="en-US" smtClean="0"/>
               <a:pPr/>
-              <a:t>24-Jan-19</a:t>
+              <a:t>25-Jan-19</a:t>
             </a:fld>
             <a:endParaRPr lang="en-US"/>
           </a:p>
@@ -1048,7 +1049,7 @@
             <a:fld id="{1D8BD707-D9CF-40AE-B4C6-C98DA3205C09}" type="datetimeFigureOut">
               <a:rPr lang="en-US" smtClean="0"/>
               <a:pPr/>
-              <a:t>24-Jan-19</a:t>
+              <a:t>25-Jan-19</a:t>
             </a:fld>
             <a:endParaRPr lang="en-US"/>
           </a:p>
@@ -1333,7 +1334,7 @@
             <a:fld id="{1D8BD707-D9CF-40AE-B4C6-C98DA3205C09}" type="datetimeFigureOut">
               <a:rPr lang="en-US" smtClean="0"/>
               <a:pPr/>
-              <a:t>24-Jan-19</a:t>
+              <a:t>25-Jan-19</a:t>
             </a:fld>
             <a:endParaRPr lang="en-US"/>
           </a:p>
@@ -1752,7 +1753,7 @@
             <a:fld id="{1D8BD707-D9CF-40AE-B4C6-C98DA3205C09}" type="datetimeFigureOut">
               <a:rPr lang="en-US" smtClean="0"/>
               <a:pPr/>
-              <a:t>24-Jan-19</a:t>
+              <a:t>25-Jan-19</a:t>
             </a:fld>
             <a:endParaRPr lang="en-US"/>
           </a:p>
@@ -1867,7 +1868,7 @@
             <a:fld id="{1D8BD707-D9CF-40AE-B4C6-C98DA3205C09}" type="datetimeFigureOut">
               <a:rPr lang="en-US" smtClean="0"/>
               <a:pPr/>
-              <a:t>24-Jan-19</a:t>
+              <a:t>25-Jan-19</a:t>
             </a:fld>
             <a:endParaRPr lang="en-US"/>
           </a:p>
@@ -1959,7 +1960,7 @@
             <a:fld id="{1D8BD707-D9CF-40AE-B4C6-C98DA3205C09}" type="datetimeFigureOut">
               <a:rPr lang="en-US" smtClean="0"/>
               <a:pPr/>
-              <a:t>24-Jan-19</a:t>
+              <a:t>25-Jan-19</a:t>
             </a:fld>
             <a:endParaRPr lang="en-US"/>
           </a:p>
@@ -2233,7 +2234,7 @@
             <a:fld id="{1D8BD707-D9CF-40AE-B4C6-C98DA3205C09}" type="datetimeFigureOut">
               <a:rPr lang="en-US" smtClean="0"/>
               <a:pPr/>
-              <a:t>24-Jan-19</a:t>
+              <a:t>25-Jan-19</a:t>
             </a:fld>
             <a:endParaRPr lang="en-US"/>
           </a:p>
@@ -2483,7 +2484,7 @@
             <a:fld id="{1D8BD707-D9CF-40AE-B4C6-C98DA3205C09}" type="datetimeFigureOut">
               <a:rPr lang="en-US" smtClean="0"/>
               <a:pPr/>
-              <a:t>24-Jan-19</a:t>
+              <a:t>25-Jan-19</a:t>
             </a:fld>
             <a:endParaRPr lang="en-US"/>
           </a:p>
@@ -2693,7 +2694,7 @@
             <a:fld id="{1D8BD707-D9CF-40AE-B4C6-C98DA3205C09}" type="datetimeFigureOut">
               <a:rPr lang="en-US" smtClean="0"/>
               <a:pPr/>
-              <a:t>24-Jan-19</a:t>
+              <a:t>25-Jan-19</a:t>
             </a:fld>
             <a:endParaRPr lang="en-US"/>
           </a:p>
@@ -3441,6 +3442,152 @@
 <file path=ppt/slides/slide5.xml><?xml version="1.0" encoding="utf-8"?>
 <p:sld xmlns:a="http://schemas.openxmlformats.org/drawingml/2006/main" xmlns:r="http://schemas.openxmlformats.org/officeDocument/2006/relationships" xmlns:p="http://schemas.openxmlformats.org/presentationml/2006/main">
   <p:cSld>
+    <p:bg>
+      <p:bgPr>
+        <a:solidFill>
+          <a:schemeClr val="bg1">
+            <a:lumMod val="75000"/>
+          </a:schemeClr>
+        </a:solidFill>
+        <a:effectLst/>
+      </p:bgPr>
+    </p:bg>
+    <p:spTree>
+      <p:nvGrpSpPr>
+        <p:cNvPr id="1" name=""/>
+        <p:cNvGrpSpPr/>
+        <p:nvPr/>
+      </p:nvGrpSpPr>
+      <p:grpSpPr>
+        <a:xfrm>
+          <a:off x="0" y="0"/>
+          <a:ext cx="0" cy="0"/>
+          <a:chOff x="0" y="0"/>
+          <a:chExt cx="0" cy="0"/>
+        </a:xfrm>
+      </p:grpSpPr>
+      <p:sp>
+        <p:nvSpPr>
+          <p:cNvPr id="2" name="TextBox 1"/>
+          <p:cNvSpPr txBox="1"/>
+          <p:nvPr/>
+        </p:nvSpPr>
+        <p:spPr>
+          <a:xfrm>
+            <a:off x="2994297" y="1097439"/>
+            <a:ext cx="12344400" cy="3154710"/>
+          </a:xfrm>
+          <a:prstGeom prst="rect">
+            <a:avLst/>
+          </a:prstGeom>
+          <a:noFill/>
+        </p:spPr>
+        <p:txBody>
+          <a:bodyPr wrap="square" rtlCol="0">
+            <a:spAutoFit/>
+          </a:bodyPr>
+          <a:lstStyle/>
+          <a:p>
+            <a:pPr algn="ctr"/>
+            <a:r>
+              <a:rPr lang="en-US" sz="19900" dirty="0" err="1" smtClean="0">
+                <a:solidFill>
+                  <a:srgbClr val="0385C1"/>
+                </a:solidFill>
+                <a:latin typeface="Nexa Bold" pitchFamily="50" charset="0"/>
+                <a:cs typeface="Arial" pitchFamily="34" charset="0"/>
+              </a:rPr>
+              <a:t>cloud</a:t>
+            </a:r>
+            <a:r>
+              <a:rPr lang="en-US" sz="19900" dirty="0" err="1" smtClean="0">
+                <a:solidFill>
+                  <a:srgbClr val="50BB49"/>
+                </a:solidFill>
+                <a:latin typeface="Nexa Bold" pitchFamily="50" charset="0"/>
+                <a:cs typeface="Arial" pitchFamily="34" charset="0"/>
+              </a:rPr>
+              <a:t>iyan</a:t>
+            </a:r>
+            <a:endParaRPr lang="en-US" sz="19900" dirty="0">
+              <a:solidFill>
+                <a:srgbClr val="50BB49"/>
+              </a:solidFill>
+              <a:latin typeface="Nexa Bold" pitchFamily="50" charset="0"/>
+              <a:cs typeface="Arial" pitchFamily="34" charset="0"/>
+            </a:endParaRPr>
+          </a:p>
+        </p:txBody>
+      </p:sp>
+      <p:sp>
+        <p:nvSpPr>
+          <p:cNvPr id="4" name="TextBox 3"/>
+          <p:cNvSpPr txBox="1"/>
+          <p:nvPr/>
+        </p:nvSpPr>
+        <p:spPr>
+          <a:xfrm>
+            <a:off x="3200400" y="5395119"/>
+            <a:ext cx="12344400" cy="3154710"/>
+          </a:xfrm>
+          <a:prstGeom prst="rect">
+            <a:avLst/>
+          </a:prstGeom>
+          <a:noFill/>
+        </p:spPr>
+        <p:txBody>
+          <a:bodyPr wrap="square" rtlCol="0">
+            <a:spAutoFit/>
+          </a:bodyPr>
+          <a:lstStyle/>
+          <a:p>
+            <a:pPr algn="ctr"/>
+            <a:r>
+              <a:rPr lang="en-US" sz="19900" dirty="0" err="1" smtClean="0">
+                <a:solidFill>
+                  <a:srgbClr val="0385C1"/>
+                </a:solidFill>
+                <a:latin typeface="Nexa Bold" pitchFamily="50" charset="0"/>
+                <a:cs typeface="Arial" pitchFamily="34" charset="0"/>
+              </a:rPr>
+              <a:t>cloud</a:t>
+            </a:r>
+            <a:r>
+              <a:rPr lang="en-US" sz="19900" dirty="0" err="1" smtClean="0">
+                <a:solidFill>
+                  <a:srgbClr val="50BB49"/>
+                </a:solidFill>
+                <a:latin typeface="Nexa Bold" pitchFamily="50" charset="0"/>
+                <a:cs typeface="Arial" pitchFamily="34" charset="0"/>
+              </a:rPr>
+              <a:t>iyan</a:t>
+            </a:r>
+            <a:endParaRPr lang="en-US" sz="19900" dirty="0">
+              <a:solidFill>
+                <a:srgbClr val="50BB49"/>
+              </a:solidFill>
+              <a:latin typeface="Nexa Bold" pitchFamily="50" charset="0"/>
+              <a:cs typeface="Arial" pitchFamily="34" charset="0"/>
+            </a:endParaRPr>
+          </a:p>
+        </p:txBody>
+      </p:sp>
+    </p:spTree>
+    <p:extLst>
+      <p:ext uri="{BB962C8B-B14F-4D97-AF65-F5344CB8AC3E}">
+        <p14:creationId xmlns:p14="http://schemas.microsoft.com/office/powerpoint/2010/main" val="1481843075"/>
+      </p:ext>
+    </p:extLst>
+  </p:cSld>
+  <p:clrMapOvr>
+    <a:masterClrMapping/>
+  </p:clrMapOvr>
+</p:sld>
+</file>
+
+<file path=ppt/slides/slide6.xml><?xml version="1.0" encoding="utf-8"?>
+<p:sld xmlns:a="http://schemas.openxmlformats.org/drawingml/2006/main" xmlns:r="http://schemas.openxmlformats.org/officeDocument/2006/relationships" xmlns:p="http://schemas.openxmlformats.org/presentationml/2006/main">
+  <p:cSld>
     <p:spTree>
       <p:nvGrpSpPr>
         <p:cNvPr id="1" name=""/>
@@ -3657,7 +3804,7 @@
 </p:sld>
 </file>
 
-<file path=ppt/slides/slide6.xml><?xml version="1.0" encoding="utf-8"?>
+<file path=ppt/slides/slide7.xml><?xml version="1.0" encoding="utf-8"?>
 <p:sld xmlns:a="http://schemas.openxmlformats.org/drawingml/2006/main" xmlns:r="http://schemas.openxmlformats.org/officeDocument/2006/relationships" xmlns:p="http://schemas.openxmlformats.org/presentationml/2006/main">
   <p:cSld>
     <p:spTree>

</xml_diff>